<commit_message>
added Day 3 hands on demos
</commit_message>
<xml_diff>
--- a/Day 3/Slides/5. A Closer Look at Methods/a-closer-look-at-methods-slides.pptx
+++ b/Day 3/Slides/5. A Closer Look at Methods/a-closer-look-at-methods-slides.pptx
@@ -5,51 +5,51 @@
     <p:sldMasterId id="2147483648" r:id="rId1"/>
   </p:sldMasterIdLst>
   <p:notesMasterIdLst>
-    <p:notesMasterId r:id="rId45"/>
+    <p:notesMasterId r:id="rId44"/>
   </p:notesMasterIdLst>
   <p:sldIdLst>
-    <p:sldId id="256" r:id="rId3"/>
-    <p:sldId id="257" r:id="rId4"/>
-    <p:sldId id="258" r:id="rId5"/>
-    <p:sldId id="259" r:id="rId6"/>
-    <p:sldId id="260" r:id="rId7"/>
-    <p:sldId id="261" r:id="rId8"/>
-    <p:sldId id="262" r:id="rId9"/>
-    <p:sldId id="263" r:id="rId10"/>
-    <p:sldId id="264" r:id="rId11"/>
-    <p:sldId id="295" r:id="rId12"/>
-    <p:sldId id="296" r:id="rId13"/>
-    <p:sldId id="265" r:id="rId14"/>
-    <p:sldId id="297" r:id="rId15"/>
-    <p:sldId id="266" r:id="rId16"/>
-    <p:sldId id="267" r:id="rId17"/>
-    <p:sldId id="268" r:id="rId18"/>
-    <p:sldId id="269" r:id="rId19"/>
-    <p:sldId id="270" r:id="rId20"/>
-    <p:sldId id="271" r:id="rId21"/>
-    <p:sldId id="272" r:id="rId22"/>
-    <p:sldId id="273" r:id="rId23"/>
-    <p:sldId id="274" r:id="rId24"/>
-    <p:sldId id="275" r:id="rId25"/>
-    <p:sldId id="298" r:id="rId26"/>
-    <p:sldId id="276" r:id="rId27"/>
-    <p:sldId id="277" r:id="rId28"/>
-    <p:sldId id="278" r:id="rId29"/>
-    <p:sldId id="279" r:id="rId30"/>
-    <p:sldId id="280" r:id="rId31"/>
-    <p:sldId id="281" r:id="rId32"/>
-    <p:sldId id="282" r:id="rId33"/>
-    <p:sldId id="283" r:id="rId34"/>
-    <p:sldId id="284" r:id="rId35"/>
-    <p:sldId id="285" r:id="rId36"/>
-    <p:sldId id="286" r:id="rId37"/>
-    <p:sldId id="287" r:id="rId38"/>
-    <p:sldId id="288" r:id="rId39"/>
-    <p:sldId id="289" r:id="rId40"/>
-    <p:sldId id="290" r:id="rId41"/>
-    <p:sldId id="291" r:id="rId42"/>
-    <p:sldId id="292" r:id="rId43"/>
-    <p:sldId id="293" r:id="rId44"/>
+    <p:sldId id="256" r:id="rId2"/>
+    <p:sldId id="257" r:id="rId3"/>
+    <p:sldId id="258" r:id="rId4"/>
+    <p:sldId id="259" r:id="rId5"/>
+    <p:sldId id="260" r:id="rId6"/>
+    <p:sldId id="261" r:id="rId7"/>
+    <p:sldId id="262" r:id="rId8"/>
+    <p:sldId id="263" r:id="rId9"/>
+    <p:sldId id="264" r:id="rId10"/>
+    <p:sldId id="295" r:id="rId11"/>
+    <p:sldId id="296" r:id="rId12"/>
+    <p:sldId id="265" r:id="rId13"/>
+    <p:sldId id="297" r:id="rId14"/>
+    <p:sldId id="266" r:id="rId15"/>
+    <p:sldId id="267" r:id="rId16"/>
+    <p:sldId id="268" r:id="rId17"/>
+    <p:sldId id="269" r:id="rId18"/>
+    <p:sldId id="270" r:id="rId19"/>
+    <p:sldId id="271" r:id="rId20"/>
+    <p:sldId id="272" r:id="rId21"/>
+    <p:sldId id="273" r:id="rId22"/>
+    <p:sldId id="274" r:id="rId23"/>
+    <p:sldId id="275" r:id="rId24"/>
+    <p:sldId id="298" r:id="rId25"/>
+    <p:sldId id="276" r:id="rId26"/>
+    <p:sldId id="277" r:id="rId27"/>
+    <p:sldId id="278" r:id="rId28"/>
+    <p:sldId id="279" r:id="rId29"/>
+    <p:sldId id="280" r:id="rId30"/>
+    <p:sldId id="281" r:id="rId31"/>
+    <p:sldId id="282" r:id="rId32"/>
+    <p:sldId id="283" r:id="rId33"/>
+    <p:sldId id="284" r:id="rId34"/>
+    <p:sldId id="285" r:id="rId35"/>
+    <p:sldId id="286" r:id="rId36"/>
+    <p:sldId id="287" r:id="rId37"/>
+    <p:sldId id="288" r:id="rId38"/>
+    <p:sldId id="289" r:id="rId39"/>
+    <p:sldId id="290" r:id="rId40"/>
+    <p:sldId id="291" r:id="rId41"/>
+    <p:sldId id="292" r:id="rId42"/>
+    <p:sldId id="293" r:id="rId43"/>
   </p:sldIdLst>
   <p:sldSz cx="12192000" cy="6858000"/>
   <p:notesSz cx="12192000" cy="6858000"/>
@@ -145,6 +145,22 @@
       </a:defRPr>
     </a:lvl9pPr>
   </p:defaultTextStyle>
+  <p:extLst>
+    <p:ext uri="{EFAFB233-063F-42B5-8137-9DF3F51BA10A}">
+      <p15:sldGuideLst xmlns:p15="http://schemas.microsoft.com/office/powerpoint/2012/main">
+        <p15:guide id="1" orient="horz" pos="2878">
+          <p15:clr>
+            <a:srgbClr val="A4A3A4"/>
+          </p15:clr>
+        </p15:guide>
+        <p15:guide id="2" pos="2134">
+          <p15:clr>
+            <a:srgbClr val="A4A3A4"/>
+          </p15:clr>
+        </p15:guide>
+      </p15:sldGuideLst>
+    </p:ext>
+  </p:extLst>
 </p:presentation>
 </file>
 
@@ -230,6 +246,7 @@
           <a:p>
             <a:fld id="{3EFD42F7-718C-4B98-AAEC-167E6DDD60A7}" type="datetimeFigureOut">
               <a:rPr lang="en-US" smtClean="0"/>
+              <a:t>8/8/2023</a:t>
             </a:fld>
             <a:endParaRPr lang="en-US"/>
           </a:p>
@@ -293,42 +310,37 @@
           <a:p>
             <a:pPr lvl="0"/>
             <a:r>
-              <a:rPr lang="en-US" smtClean="0"/>
+              <a:rPr lang="en-US"/>
               <a:t>Click to edit Master text styles</a:t>
             </a:r>
-            <a:endParaRPr lang="en-US" smtClean="0"/>
           </a:p>
           <a:p>
             <a:pPr lvl="1"/>
             <a:r>
-              <a:rPr lang="en-US" smtClean="0"/>
+              <a:rPr lang="en-US"/>
               <a:t>Second level</a:t>
             </a:r>
-            <a:endParaRPr lang="en-US" smtClean="0"/>
           </a:p>
           <a:p>
             <a:pPr lvl="2"/>
             <a:r>
-              <a:rPr lang="en-US" smtClean="0"/>
+              <a:rPr lang="en-US"/>
               <a:t>Third level</a:t>
             </a:r>
-            <a:endParaRPr lang="en-US" smtClean="0"/>
           </a:p>
           <a:p>
             <a:pPr lvl="3"/>
             <a:r>
-              <a:rPr lang="en-US" smtClean="0"/>
+              <a:rPr lang="en-US"/>
               <a:t>Fourth level</a:t>
             </a:r>
-            <a:endParaRPr lang="en-US" smtClean="0"/>
           </a:p>
           <a:p>
             <a:pPr lvl="4"/>
             <a:r>
-              <a:rPr lang="en-US" smtClean="0"/>
+              <a:rPr lang="en-US"/>
               <a:t>Fifth level</a:t>
             </a:r>
-            <a:endParaRPr lang="en-US"/>
           </a:p>
         </p:txBody>
       </p:sp>
@@ -392,6 +404,7 @@
           <a:p>
             <a:fld id="{21B2AA4F-B828-4D7C-AFD3-893933DAFCB4}" type="slidenum">
               <a:rPr lang="en-US" smtClean="0"/>
+              <a:t>‹#›</a:t>
             </a:fld>
             <a:endParaRPr lang="en-US"/>
           </a:p>
@@ -540,7 +553,9 @@
               <a:defRPr/>
             </a:lvl1pPr>
           </a:lstStyle>
-          <a:p/>
+          <a:p>
+            <a:endParaRPr/>
+          </a:p>
         </p:txBody>
       </p:sp>
       <p:sp>
@@ -571,7 +586,9 @@
               <a:defRPr/>
             </a:lvl1pPr>
           </a:lstStyle>
-          <a:p/>
+          <a:p>
+            <a:endParaRPr/>
+          </a:p>
         </p:txBody>
       </p:sp>
       <p:sp>
@@ -598,7 +615,9 @@
               </a:defRPr>
             </a:lvl1pPr>
           </a:lstStyle>
-          <a:p/>
+          <a:p>
+            <a:endParaRPr/>
+          </a:p>
         </p:txBody>
       </p:sp>
       <p:sp>
@@ -628,6 +647,7 @@
           <a:p>
             <a:fld id="{1D8BD707-D9CF-40AE-B4C6-C98DA3205C09}" type="datetimeFigureOut">
               <a:rPr lang="en-US"/>
+              <a:t>8/8/2023</a:t>
             </a:fld>
             <a:endParaRPr lang="en-US"/>
           </a:p>
@@ -660,6 +680,7 @@
           <a:p>
             <a:fld id="{B6F15528-21DE-4FAA-801E-634DDDAF4B2B}" type="slidenum">
               <a:rPr/>
+              <a:t>‹#›</a:t>
             </a:fld>
             <a:endParaRPr/>
           </a:p>
@@ -675,7 +696,7 @@
 </file>
 
 <file path=ppt/slideLayouts/slideLayout2.xml><?xml version="1.0" encoding="utf-8"?>
-<p:sldLayout xmlns:a="http://schemas.openxmlformats.org/drawingml/2006/main" xmlns:r="http://schemas.openxmlformats.org/officeDocument/2006/relationships" xmlns:p="http://schemas.openxmlformats.org/presentationml/2006/main" type="obj" preserve="1" showMasterSp="0">
+<p:sldLayout xmlns:a="http://schemas.openxmlformats.org/drawingml/2006/main" xmlns:r="http://schemas.openxmlformats.org/officeDocument/2006/relationships" xmlns:p="http://schemas.openxmlformats.org/presentationml/2006/main" showMasterSp="0" type="obj" preserve="1">
   <p:cSld name="Title and Content">
     <p:bg>
       <p:bgPr>
@@ -744,7 +765,9 @@
         <p:txBody>
           <a:bodyPr wrap="square" lIns="0" tIns="0" rIns="0" bIns="0" rtlCol="0"/>
           <a:lstStyle/>
-          <a:p/>
+          <a:p>
+            <a:endParaRPr/>
+          </a:p>
         </p:txBody>
       </p:sp>
       <p:pic>
@@ -826,7 +849,9 @@
         <p:txBody>
           <a:bodyPr wrap="square" lIns="0" tIns="0" rIns="0" bIns="0" rtlCol="0"/>
           <a:lstStyle/>
-          <a:p/>
+          <a:p>
+            <a:endParaRPr/>
+          </a:p>
         </p:txBody>
       </p:sp>
       <p:sp>
@@ -853,7 +878,9 @@
               </a:defRPr>
             </a:lvl1pPr>
           </a:lstStyle>
-          <a:p/>
+          <a:p>
+            <a:endParaRPr/>
+          </a:p>
         </p:txBody>
       </p:sp>
       <p:sp>
@@ -880,7 +907,9 @@
               </a:defRPr>
             </a:lvl1pPr>
           </a:lstStyle>
-          <a:p/>
+          <a:p>
+            <a:endParaRPr/>
+          </a:p>
         </p:txBody>
       </p:sp>
       <p:sp>
@@ -907,7 +936,9 @@
               </a:defRPr>
             </a:lvl1pPr>
           </a:lstStyle>
-          <a:p/>
+          <a:p>
+            <a:endParaRPr/>
+          </a:p>
         </p:txBody>
       </p:sp>
       <p:sp>
@@ -937,6 +968,7 @@
           <a:p>
             <a:fld id="{1D8BD707-D9CF-40AE-B4C6-C98DA3205C09}" type="datetimeFigureOut">
               <a:rPr lang="en-US"/>
+              <a:t>8/8/2023</a:t>
             </a:fld>
             <a:endParaRPr lang="en-US"/>
           </a:p>
@@ -969,6 +1001,7 @@
           <a:p>
             <a:fld id="{B6F15528-21DE-4FAA-801E-634DDDAF4B2B}" type="slidenum">
               <a:rPr/>
+              <a:t>‹#›</a:t>
             </a:fld>
             <a:endParaRPr/>
           </a:p>
@@ -984,7 +1017,7 @@
 </file>
 
 <file path=ppt/slideLayouts/slideLayout3.xml><?xml version="1.0" encoding="utf-8"?>
-<p:sldLayout xmlns:a="http://schemas.openxmlformats.org/drawingml/2006/main" xmlns:r="http://schemas.openxmlformats.org/officeDocument/2006/relationships" xmlns:p="http://schemas.openxmlformats.org/presentationml/2006/main" type="obj" preserve="1" showMasterSp="0">
+<p:sldLayout xmlns:a="http://schemas.openxmlformats.org/drawingml/2006/main" xmlns:r="http://schemas.openxmlformats.org/officeDocument/2006/relationships" xmlns:p="http://schemas.openxmlformats.org/presentationml/2006/main" showMasterSp="0" type="obj" preserve="1">
   <p:cSld name="Two Content">
     <p:bg>
       <p:bgPr>
@@ -1053,7 +1086,9 @@
         <p:txBody>
           <a:bodyPr wrap="square" lIns="0" tIns="0" rIns="0" bIns="0" rtlCol="0"/>
           <a:lstStyle/>
-          <a:p/>
+          <a:p>
+            <a:endParaRPr/>
+          </a:p>
         </p:txBody>
       </p:sp>
       <p:pic>
@@ -1135,7 +1170,9 @@
         <p:txBody>
           <a:bodyPr wrap="square" lIns="0" tIns="0" rIns="0" bIns="0" rtlCol="0"/>
           <a:lstStyle/>
-          <a:p/>
+          <a:p>
+            <a:endParaRPr/>
+          </a:p>
         </p:txBody>
       </p:sp>
       <p:sp>
@@ -1195,7 +1232,9 @@
         <p:txBody>
           <a:bodyPr wrap="square" lIns="0" tIns="0" rIns="0" bIns="0" rtlCol="0"/>
           <a:lstStyle/>
-          <a:p/>
+          <a:p>
+            <a:endParaRPr/>
+          </a:p>
         </p:txBody>
       </p:sp>
       <p:sp>
@@ -1222,7 +1261,9 @@
               </a:defRPr>
             </a:lvl1pPr>
           </a:lstStyle>
-          <a:p/>
+          <a:p>
+            <a:endParaRPr/>
+          </a:p>
         </p:txBody>
       </p:sp>
       <p:sp>
@@ -1259,7 +1300,9 @@
               </a:defRPr>
             </a:lvl1pPr>
           </a:lstStyle>
-          <a:p/>
+          <a:p>
+            <a:endParaRPr/>
+          </a:p>
         </p:txBody>
       </p:sp>
       <p:sp>
@@ -1290,7 +1333,9 @@
               <a:defRPr/>
             </a:lvl1pPr>
           </a:lstStyle>
-          <a:p/>
+          <a:p>
+            <a:endParaRPr/>
+          </a:p>
         </p:txBody>
       </p:sp>
       <p:sp>
@@ -1317,7 +1362,9 @@
               </a:defRPr>
             </a:lvl1pPr>
           </a:lstStyle>
-          <a:p/>
+          <a:p>
+            <a:endParaRPr/>
+          </a:p>
         </p:txBody>
       </p:sp>
       <p:sp>
@@ -1347,6 +1394,7 @@
           <a:p>
             <a:fld id="{1D8BD707-D9CF-40AE-B4C6-C98DA3205C09}" type="datetimeFigureOut">
               <a:rPr lang="en-US"/>
+              <a:t>8/8/2023</a:t>
             </a:fld>
             <a:endParaRPr lang="en-US"/>
           </a:p>
@@ -1379,6 +1427,7 @@
           <a:p>
             <a:fld id="{B6F15528-21DE-4FAA-801E-634DDDAF4B2B}" type="slidenum">
               <a:rPr/>
+              <a:t>‹#›</a:t>
             </a:fld>
             <a:endParaRPr/>
           </a:p>
@@ -1434,7 +1483,9 @@
               </a:defRPr>
             </a:lvl1pPr>
           </a:lstStyle>
-          <a:p/>
+          <a:p>
+            <a:endParaRPr/>
+          </a:p>
         </p:txBody>
       </p:sp>
       <p:sp>
@@ -1461,7 +1512,9 @@
               </a:defRPr>
             </a:lvl1pPr>
           </a:lstStyle>
-          <a:p/>
+          <a:p>
+            <a:endParaRPr/>
+          </a:p>
         </p:txBody>
       </p:sp>
       <p:sp>
@@ -1491,6 +1544,7 @@
           <a:p>
             <a:fld id="{1D8BD707-D9CF-40AE-B4C6-C98DA3205C09}" type="datetimeFigureOut">
               <a:rPr lang="en-US"/>
+              <a:t>8/8/2023</a:t>
             </a:fld>
             <a:endParaRPr lang="en-US"/>
           </a:p>
@@ -1523,6 +1577,7 @@
           <a:p>
             <a:fld id="{B6F15528-21DE-4FAA-801E-634DDDAF4B2B}" type="slidenum">
               <a:rPr/>
+              <a:t>‹#›</a:t>
             </a:fld>
             <a:endParaRPr/>
           </a:p>
@@ -1538,7 +1593,7 @@
 </file>
 
 <file path=ppt/slideLayouts/slideLayout5.xml><?xml version="1.0" encoding="utf-8"?>
-<p:sldLayout xmlns:a="http://schemas.openxmlformats.org/drawingml/2006/main" xmlns:r="http://schemas.openxmlformats.org/officeDocument/2006/relationships" xmlns:p="http://schemas.openxmlformats.org/presentationml/2006/main" type="obj" preserve="1" showMasterSp="0">
+<p:sldLayout xmlns:a="http://schemas.openxmlformats.org/drawingml/2006/main" xmlns:r="http://schemas.openxmlformats.org/officeDocument/2006/relationships" xmlns:p="http://schemas.openxmlformats.org/presentationml/2006/main" showMasterSp="0" type="obj" preserve="1">
   <p:cSld name="Blank">
     <p:bg>
       <p:bgPr>
@@ -1607,7 +1662,9 @@
         <p:txBody>
           <a:bodyPr wrap="square" lIns="0" tIns="0" rIns="0" bIns="0" rtlCol="0"/>
           <a:lstStyle/>
-          <a:p/>
+          <a:p>
+            <a:endParaRPr/>
+          </a:p>
         </p:txBody>
       </p:sp>
       <p:sp>
@@ -1634,7 +1691,9 @@
               </a:defRPr>
             </a:lvl1pPr>
           </a:lstStyle>
-          <a:p/>
+          <a:p>
+            <a:endParaRPr/>
+          </a:p>
         </p:txBody>
       </p:sp>
       <p:sp>
@@ -1664,6 +1723,7 @@
           <a:p>
             <a:fld id="{1D8BD707-D9CF-40AE-B4C6-C98DA3205C09}" type="datetimeFigureOut">
               <a:rPr lang="en-US"/>
+              <a:t>8/8/2023</a:t>
             </a:fld>
             <a:endParaRPr lang="en-US"/>
           </a:p>
@@ -1696,6 +1756,7 @@
           <a:p>
             <a:fld id="{B6F15528-21DE-4FAA-801E-634DDDAF4B2B}" type="slidenum">
               <a:rPr/>
+              <a:t>‹#›</a:t>
             </a:fld>
             <a:endParaRPr/>
           </a:p>
@@ -1769,7 +1830,9 @@
               </a:defRPr>
             </a:lvl1pPr>
           </a:lstStyle>
-          <a:p/>
+          <a:p>
+            <a:endParaRPr/>
+          </a:p>
         </p:txBody>
       </p:sp>
       <p:sp>
@@ -1806,7 +1869,9 @@
               </a:defRPr>
             </a:lvl1pPr>
           </a:lstStyle>
-          <a:p/>
+          <a:p>
+            <a:endParaRPr/>
+          </a:p>
         </p:txBody>
       </p:sp>
       <p:sp>
@@ -1843,7 +1908,9 @@
               </a:defRPr>
             </a:lvl1pPr>
           </a:lstStyle>
-          <a:p/>
+          <a:p>
+            <a:endParaRPr/>
+          </a:p>
         </p:txBody>
       </p:sp>
       <p:sp>
@@ -1883,6 +1950,7 @@
           <a:p>
             <a:fld id="{1D8BD707-D9CF-40AE-B4C6-C98DA3205C09}" type="datetimeFigureOut">
               <a:rPr lang="en-US"/>
+              <a:t>8/8/2023</a:t>
             </a:fld>
             <a:endParaRPr lang="en-US"/>
           </a:p>
@@ -1925,6 +1993,7 @@
           <a:p>
             <a:fld id="{B6F15528-21DE-4FAA-801E-634DDDAF4B2B}" type="slidenum">
               <a:rPr/>
+              <a:t>‹#›</a:t>
             </a:fld>
             <a:endParaRPr/>
           </a:p>
@@ -2148,7 +2217,9 @@
           <p:txBody>
             <a:bodyPr wrap="square" lIns="0" tIns="0" rIns="0" bIns="0" rtlCol="0"/>
             <a:lstStyle/>
-            <a:p/>
+            <a:p>
+              <a:endParaRPr/>
+            </a:p>
           </p:txBody>
         </p:sp>
         <p:pic>
@@ -2158,7 +2229,7 @@
             <p:nvPr/>
           </p:nvPicPr>
           <p:blipFill>
-            <a:blip r:embed="rId1" cstate="print"/>
+            <a:blip r:embed="rId2" cstate="print"/>
             <a:stretch>
               <a:fillRect/>
             </a:stretch>
@@ -2265,167 +2336,147 @@
                 <a:latin typeface="Verdana" panose="020B0604030504040204"/>
                 <a:cs typeface="Verdana" panose="020B0604030504040204"/>
               </a:rPr>
-              <a:t>s</a:t>
-            </a:r>
-            <a:r>
-              <a:rPr sz="4500" spc="-180" dirty="0">
+              <a:t>se</a:t>
+            </a:r>
+            <a:r>
+              <a:rPr sz="4500" spc="-100" dirty="0">
                 <a:solidFill>
                   <a:srgbClr val="171717"/>
                 </a:solidFill>
                 <a:latin typeface="Verdana" panose="020B0604030504040204"/>
                 <a:cs typeface="Verdana" panose="020B0604030504040204"/>
               </a:rPr>
+              <a:t>r</a:t>
+            </a:r>
+            <a:r>
+              <a:rPr sz="4500" spc="-455" dirty="0">
+                <a:solidFill>
+                  <a:srgbClr val="171717"/>
+                </a:solidFill>
+                <a:latin typeface="Verdana" panose="020B0604030504040204"/>
+                <a:cs typeface="Verdana" panose="020B0604030504040204"/>
+              </a:rPr>
+              <a:t> </a:t>
+            </a:r>
+            <a:r>
+              <a:rPr sz="4500" spc="125" dirty="0">
+                <a:solidFill>
+                  <a:srgbClr val="171717"/>
+                </a:solidFill>
+                <a:latin typeface="Verdana" panose="020B0604030504040204"/>
+                <a:cs typeface="Verdana" panose="020B0604030504040204"/>
+              </a:rPr>
+              <a:t>L</a:t>
+            </a:r>
+            <a:r>
+              <a:rPr sz="4500" spc="65" dirty="0">
+                <a:solidFill>
+                  <a:srgbClr val="171717"/>
+                </a:solidFill>
+                <a:latin typeface="Verdana" panose="020B0604030504040204"/>
+                <a:cs typeface="Verdana" panose="020B0604030504040204"/>
+              </a:rPr>
+              <a:t>oo</a:t>
+            </a:r>
+            <a:r>
+              <a:rPr sz="4500" spc="-105" dirty="0">
+                <a:solidFill>
+                  <a:srgbClr val="171717"/>
+                </a:solidFill>
+                <a:latin typeface="Verdana" panose="020B0604030504040204"/>
+                <a:cs typeface="Verdana" panose="020B0604030504040204"/>
+              </a:rPr>
+              <a:t>k</a:t>
+            </a:r>
+            <a:r>
+              <a:rPr sz="4500" spc="-455" dirty="0">
+                <a:solidFill>
+                  <a:srgbClr val="171717"/>
+                </a:solidFill>
+                <a:latin typeface="Verdana" panose="020B0604030504040204"/>
+                <a:cs typeface="Verdana" panose="020B0604030504040204"/>
+              </a:rPr>
+              <a:t> </a:t>
+            </a:r>
+            <a:r>
+              <a:rPr sz="4500" spc="-240" dirty="0">
+                <a:solidFill>
+                  <a:srgbClr val="171717"/>
+                </a:solidFill>
+                <a:latin typeface="Verdana" panose="020B0604030504040204"/>
+                <a:cs typeface="Verdana" panose="020B0604030504040204"/>
+              </a:rPr>
+              <a:t>a</a:t>
+            </a:r>
+            <a:r>
+              <a:rPr sz="4500" spc="40" dirty="0">
+                <a:solidFill>
+                  <a:srgbClr val="171717"/>
+                </a:solidFill>
+                <a:latin typeface="Verdana" panose="020B0604030504040204"/>
+                <a:cs typeface="Verdana" panose="020B0604030504040204"/>
+              </a:rPr>
+              <a:t>t</a:t>
+            </a:r>
+            <a:r>
+              <a:rPr sz="4500" spc="-465" dirty="0">
+                <a:solidFill>
+                  <a:srgbClr val="171717"/>
+                </a:solidFill>
+                <a:latin typeface="Verdana" panose="020B0604030504040204"/>
+                <a:cs typeface="Verdana" panose="020B0604030504040204"/>
+              </a:rPr>
+              <a:t> </a:t>
+            </a:r>
+            <a:r>
+              <a:rPr sz="4500" spc="-65" dirty="0">
+                <a:solidFill>
+                  <a:srgbClr val="171717"/>
+                </a:solidFill>
+                <a:latin typeface="Verdana" panose="020B0604030504040204"/>
+                <a:cs typeface="Verdana" panose="020B0604030504040204"/>
+              </a:rPr>
+              <a:t>M</a:t>
+            </a:r>
+            <a:r>
+              <a:rPr sz="4500" spc="-75" dirty="0">
+                <a:solidFill>
+                  <a:srgbClr val="171717"/>
+                </a:solidFill>
+                <a:latin typeface="Verdana" panose="020B0604030504040204"/>
+                <a:cs typeface="Verdana" panose="020B0604030504040204"/>
+              </a:rPr>
               <a:t>e</a:t>
             </a:r>
             <a:r>
-              <a:rPr sz="4500" spc="-100" dirty="0">
+              <a:rPr sz="4500" spc="-135" dirty="0">
                 <a:solidFill>
                   <a:srgbClr val="171717"/>
                 </a:solidFill>
                 <a:latin typeface="Verdana" panose="020B0604030504040204"/>
                 <a:cs typeface="Verdana" panose="020B0604030504040204"/>
               </a:rPr>
-              <a:t>r</a:t>
-            </a:r>
-            <a:r>
-              <a:rPr sz="4500" spc="-455" dirty="0">
+              <a:t>t</a:t>
+            </a:r>
+            <a:r>
+              <a:rPr sz="4500" spc="-130" dirty="0">
                 <a:solidFill>
                   <a:srgbClr val="171717"/>
                 </a:solidFill>
                 <a:latin typeface="Verdana" panose="020B0604030504040204"/>
                 <a:cs typeface="Verdana" panose="020B0604030504040204"/>
               </a:rPr>
-              <a:t> </a:t>
-            </a:r>
-            <a:r>
-              <a:rPr sz="4500" spc="125" dirty="0">
+              <a:t>h</a:t>
+            </a:r>
+            <a:r>
+              <a:rPr sz="4500" spc="65" dirty="0">
                 <a:solidFill>
                   <a:srgbClr val="171717"/>
                 </a:solidFill>
                 <a:latin typeface="Verdana" panose="020B0604030504040204"/>
                 <a:cs typeface="Verdana" panose="020B0604030504040204"/>
               </a:rPr>
-              <a:t>L</a:t>
-            </a:r>
-            <a:r>
-              <a:rPr sz="4500" spc="65" dirty="0">
-                <a:solidFill>
-                  <a:srgbClr val="171717"/>
-                </a:solidFill>
-                <a:latin typeface="Verdana" panose="020B0604030504040204"/>
-                <a:cs typeface="Verdana" panose="020B0604030504040204"/>
-              </a:rPr>
-              <a:t>oo</a:t>
-            </a:r>
-            <a:r>
-              <a:rPr sz="4500" spc="-105" dirty="0">
-                <a:solidFill>
-                  <a:srgbClr val="171717"/>
-                </a:solidFill>
-                <a:latin typeface="Verdana" panose="020B0604030504040204"/>
-                <a:cs typeface="Verdana" panose="020B0604030504040204"/>
-              </a:rPr>
-              <a:t>k</a:t>
-            </a:r>
-            <a:r>
-              <a:rPr sz="4500" spc="-455" dirty="0">
-                <a:solidFill>
-                  <a:srgbClr val="171717"/>
-                </a:solidFill>
-                <a:latin typeface="Verdana" panose="020B0604030504040204"/>
-                <a:cs typeface="Verdana" panose="020B0604030504040204"/>
-              </a:rPr>
-              <a:t> </a:t>
-            </a:r>
-            <a:r>
-              <a:rPr sz="4500" spc="-240" dirty="0">
-                <a:solidFill>
-                  <a:srgbClr val="171717"/>
-                </a:solidFill>
-                <a:latin typeface="Verdana" panose="020B0604030504040204"/>
-                <a:cs typeface="Verdana" panose="020B0604030504040204"/>
-              </a:rPr>
-              <a:t>a</a:t>
-            </a:r>
-            <a:r>
-              <a:rPr sz="4500" spc="40" dirty="0">
-                <a:solidFill>
-                  <a:srgbClr val="171717"/>
-                </a:solidFill>
-                <a:latin typeface="Verdana" panose="020B0604030504040204"/>
-                <a:cs typeface="Verdana" panose="020B0604030504040204"/>
-              </a:rPr>
-              <a:t>t</a:t>
-            </a:r>
-            <a:r>
-              <a:rPr sz="4500" spc="-465" dirty="0">
-                <a:solidFill>
-                  <a:srgbClr val="171717"/>
-                </a:solidFill>
-                <a:latin typeface="Verdana" panose="020B0604030504040204"/>
-                <a:cs typeface="Verdana" panose="020B0604030504040204"/>
-              </a:rPr>
-              <a:t> </a:t>
-            </a:r>
-            <a:r>
-              <a:rPr sz="4500" spc="-65" dirty="0">
-                <a:solidFill>
-                  <a:srgbClr val="171717"/>
-                </a:solidFill>
-                <a:latin typeface="Verdana" panose="020B0604030504040204"/>
-                <a:cs typeface="Verdana" panose="020B0604030504040204"/>
-              </a:rPr>
-              <a:t>M</a:t>
-            </a:r>
-            <a:r>
-              <a:rPr sz="4500" spc="-75" dirty="0">
-                <a:solidFill>
-                  <a:srgbClr val="171717"/>
-                </a:solidFill>
-                <a:latin typeface="Verdana" panose="020B0604030504040204"/>
-                <a:cs typeface="Verdana" panose="020B0604030504040204"/>
-              </a:rPr>
-              <a:t>e</a:t>
-            </a:r>
-            <a:r>
-              <a:rPr sz="4500" spc="-135" dirty="0">
-                <a:solidFill>
-                  <a:srgbClr val="171717"/>
-                </a:solidFill>
-                <a:latin typeface="Verdana" panose="020B0604030504040204"/>
-                <a:cs typeface="Verdana" panose="020B0604030504040204"/>
-              </a:rPr>
-              <a:t>t</a:t>
-            </a:r>
-            <a:r>
-              <a:rPr sz="4500" spc="-130" dirty="0">
-                <a:solidFill>
-                  <a:srgbClr val="171717"/>
-                </a:solidFill>
-                <a:latin typeface="Verdana" panose="020B0604030504040204"/>
-                <a:cs typeface="Verdana" panose="020B0604030504040204"/>
-              </a:rPr>
-              <a:t>h</a:t>
-            </a:r>
-            <a:r>
-              <a:rPr sz="4500" spc="65" dirty="0">
-                <a:solidFill>
-                  <a:srgbClr val="171717"/>
-                </a:solidFill>
-                <a:latin typeface="Verdana" panose="020B0604030504040204"/>
-                <a:cs typeface="Verdana" panose="020B0604030504040204"/>
-              </a:rPr>
-              <a:t>o</a:t>
-            </a:r>
-            <a:r>
-              <a:rPr sz="4500" spc="65" dirty="0">
-                <a:solidFill>
-                  <a:srgbClr val="171717"/>
-                </a:solidFill>
-                <a:latin typeface="Verdana" panose="020B0604030504040204"/>
-                <a:cs typeface="Verdana" panose="020B0604030504040204"/>
-              </a:rPr>
-              <a:t>d</a:t>
+              <a:t>od</a:t>
             </a:r>
             <a:r>
               <a:rPr sz="4500" spc="-105" dirty="0">
@@ -2457,9 +2508,11 @@
         <p:spPr/>
         <p:txBody>
           <a:bodyPr/>
+          <a:lstStyle/>
           <a:p>
             <a:fld id="{B6F15528-21DE-4FAA-801E-634DDDAF4B2B}" type="slidenum">
               <a:rPr/>
+              <a:t>1</a:t>
             </a:fld>
             <a:endParaRPr/>
           </a:p>
@@ -3419,7 +3472,9 @@
           <p:txBody>
             <a:bodyPr wrap="square" lIns="0" tIns="0" rIns="0" bIns="0" rtlCol="0"/>
             <a:lstStyle/>
-            <a:p/>
+            <a:p>
+              <a:endParaRPr/>
+            </a:p>
           </p:txBody>
         </p:sp>
         <p:sp>
@@ -3467,7 +3522,9 @@
           <p:txBody>
             <a:bodyPr wrap="square" lIns="0" tIns="0" rIns="0" bIns="0" rtlCol="0"/>
             <a:lstStyle/>
-            <a:p/>
+            <a:p>
+              <a:endParaRPr/>
+            </a:p>
           </p:txBody>
         </p:sp>
         <p:sp>
@@ -3517,7 +3574,9 @@
           <p:txBody>
             <a:bodyPr wrap="square" lIns="0" tIns="0" rIns="0" bIns="0" rtlCol="0"/>
             <a:lstStyle/>
-            <a:p/>
+            <a:p>
+              <a:endParaRPr/>
+            </a:p>
           </p:txBody>
         </p:sp>
       </p:grpSp>
@@ -3580,7 +3639,9 @@
           <p:txBody>
             <a:bodyPr wrap="square" lIns="0" tIns="0" rIns="0" bIns="0" rtlCol="0"/>
             <a:lstStyle/>
-            <a:p/>
+            <a:p>
+              <a:endParaRPr/>
+            </a:p>
           </p:txBody>
         </p:sp>
         <p:sp>
@@ -3630,7 +3691,9 @@
           <p:txBody>
             <a:bodyPr wrap="square" lIns="0" tIns="0" rIns="0" bIns="0" rtlCol="0"/>
             <a:lstStyle/>
-            <a:p/>
+            <a:p>
+              <a:endParaRPr/>
+            </a:p>
           </p:txBody>
         </p:sp>
         <p:sp>
@@ -3834,7 +3897,9 @@
           <p:txBody>
             <a:bodyPr wrap="square" lIns="0" tIns="0" rIns="0" bIns="0" rtlCol="0"/>
             <a:lstStyle/>
-            <a:p/>
+            <a:p>
+              <a:endParaRPr/>
+            </a:p>
           </p:txBody>
         </p:sp>
       </p:grpSp>
@@ -3871,7 +3936,6 @@
               <a:rPr spc="-5" dirty="0"/>
               <a:t>val1</a:t>
             </a:r>
-            <a:endParaRPr spc="-5" dirty="0"/>
           </a:p>
         </p:txBody>
       </p:sp>
@@ -3980,7 +4044,9 @@
         <p:txBody>
           <a:bodyPr wrap="square" lIns="0" tIns="0" rIns="0" bIns="0" rtlCol="0"/>
           <a:lstStyle/>
-          <a:p/>
+          <a:p>
+            <a:endParaRPr/>
+          </a:p>
         </p:txBody>
       </p:sp>
       <p:sp>
@@ -4088,7 +4154,9 @@
           <p:txBody>
             <a:bodyPr wrap="square" lIns="0" tIns="0" rIns="0" bIns="0" rtlCol="0"/>
             <a:lstStyle/>
-            <a:p/>
+            <a:p>
+              <a:endParaRPr/>
+            </a:p>
           </p:txBody>
         </p:sp>
         <p:sp>
@@ -4138,7 +4206,9 @@
           <p:txBody>
             <a:bodyPr wrap="square" lIns="0" tIns="0" rIns="0" bIns="0" rtlCol="0"/>
             <a:lstStyle/>
-            <a:p/>
+            <a:p>
+              <a:endParaRPr/>
+            </a:p>
           </p:txBody>
         </p:sp>
         <p:sp>
@@ -4342,7 +4412,9 @@
           <p:txBody>
             <a:bodyPr wrap="square" lIns="0" tIns="0" rIns="0" bIns="0" rtlCol="0"/>
             <a:lstStyle/>
-            <a:p/>
+            <a:p>
+              <a:endParaRPr/>
+            </a:p>
           </p:txBody>
         </p:sp>
       </p:grpSp>
@@ -4451,7 +4523,9 @@
           <p:txBody>
             <a:bodyPr wrap="square" lIns="0" tIns="0" rIns="0" bIns="0" rtlCol="0"/>
             <a:lstStyle/>
-            <a:p/>
+            <a:p>
+              <a:endParaRPr/>
+            </a:p>
           </p:txBody>
         </p:sp>
         <p:sp>
@@ -4501,7 +4575,9 @@
           <p:txBody>
             <a:bodyPr wrap="square" lIns="0" tIns="0" rIns="0" bIns="0" rtlCol="0"/>
             <a:lstStyle/>
-            <a:p/>
+            <a:p>
+              <a:endParaRPr/>
+            </a:p>
           </p:txBody>
         </p:sp>
       </p:grpSp>
@@ -4610,7 +4686,9 @@
           <p:txBody>
             <a:bodyPr wrap="square" lIns="0" tIns="0" rIns="0" bIns="0" rtlCol="0"/>
             <a:lstStyle/>
-            <a:p/>
+            <a:p>
+              <a:endParaRPr/>
+            </a:p>
           </p:txBody>
         </p:sp>
         <p:sp>
@@ -4660,7 +4738,9 @@
           <p:txBody>
             <a:bodyPr wrap="square" lIns="0" tIns="0" rIns="0" bIns="0" rtlCol="0"/>
             <a:lstStyle/>
-            <a:p/>
+            <a:p>
+              <a:endParaRPr/>
+            </a:p>
           </p:txBody>
         </p:sp>
       </p:grpSp>
@@ -4931,7 +5011,9 @@
           <p:txBody>
             <a:bodyPr wrap="square" lIns="0" tIns="0" rIns="0" bIns="0" rtlCol="0"/>
             <a:lstStyle/>
-            <a:p/>
+            <a:p>
+              <a:endParaRPr/>
+            </a:p>
           </p:txBody>
         </p:sp>
         <p:sp>
@@ -5141,7 +5223,9 @@
           <p:txBody>
             <a:bodyPr wrap="square" lIns="0" tIns="0" rIns="0" bIns="0" rtlCol="0"/>
             <a:lstStyle/>
-            <a:p/>
+            <a:p>
+              <a:endParaRPr/>
+            </a:p>
           </p:txBody>
         </p:sp>
         <p:sp>
@@ -5251,7 +5335,9 @@
           <p:txBody>
             <a:bodyPr wrap="square" lIns="0" tIns="0" rIns="0" bIns="0" rtlCol="0"/>
             <a:lstStyle/>
-            <a:p/>
+            <a:p>
+              <a:endParaRPr/>
+            </a:p>
           </p:txBody>
         </p:sp>
       </p:grpSp>
@@ -5361,10 +5447,6 @@
               </a:rPr>
               <a:t>20</a:t>
             </a:r>
-            <a:endParaRPr lang="en-US" sz="2000">
-              <a:latin typeface="Courier New" panose="02070309020205020404"/>
-              <a:cs typeface="Courier New" panose="02070309020205020404"/>
-            </a:endParaRPr>
           </a:p>
         </p:txBody>
       </p:sp>
@@ -5475,7 +5557,9 @@
         <p:txBody>
           <a:bodyPr wrap="square" lIns="0" tIns="0" rIns="0" bIns="0" rtlCol="0"/>
           <a:lstStyle/>
-          <a:p/>
+          <a:p>
+            <a:endParaRPr/>
+          </a:p>
         </p:txBody>
       </p:sp>
       <p:sp>
@@ -5520,13 +5604,6 @@
               </a:rPr>
               <a:t>10</a:t>
             </a:r>
-            <a:endParaRPr sz="2000" spc="-5" dirty="0">
-              <a:solidFill>
-                <a:schemeClr val="bg1"/>
-              </a:solidFill>
-              <a:latin typeface="Courier New" panose="02070309020205020404"/>
-              <a:cs typeface="Courier New" panose="02070309020205020404"/>
-            </a:endParaRPr>
           </a:p>
         </p:txBody>
       </p:sp>
@@ -5574,10 +5651,6 @@
               </a:rPr>
               <a:t>20</a:t>
             </a:r>
-            <a:endParaRPr lang="en-US" sz="3000" baseline="1000">
-              <a:latin typeface="Courier New" panose="02070309020205020404"/>
-              <a:cs typeface="Courier New" panose="02070309020205020404"/>
-            </a:endParaRPr>
           </a:p>
         </p:txBody>
       </p:sp>
@@ -5594,9 +5667,11 @@
         <p:spPr/>
         <p:txBody>
           <a:bodyPr/>
+          <a:lstStyle/>
           <a:p>
             <a:fld id="{B6F15528-21DE-4FAA-801E-634DDDAF4B2B}" type="slidenum">
               <a:rPr/>
+              <a:t>10</a:t>
             </a:fld>
             <a:endParaRPr/>
           </a:p>
@@ -6556,7 +6631,9 @@
           <p:txBody>
             <a:bodyPr wrap="square" lIns="0" tIns="0" rIns="0" bIns="0" rtlCol="0"/>
             <a:lstStyle/>
-            <a:p/>
+            <a:p>
+              <a:endParaRPr/>
+            </a:p>
           </p:txBody>
         </p:sp>
         <p:sp>
@@ -6604,7 +6681,9 @@
           <p:txBody>
             <a:bodyPr wrap="square" lIns="0" tIns="0" rIns="0" bIns="0" rtlCol="0"/>
             <a:lstStyle/>
-            <a:p/>
+            <a:p>
+              <a:endParaRPr/>
+            </a:p>
           </p:txBody>
         </p:sp>
         <p:sp>
@@ -6654,7 +6733,9 @@
           <p:txBody>
             <a:bodyPr wrap="square" lIns="0" tIns="0" rIns="0" bIns="0" rtlCol="0"/>
             <a:lstStyle/>
-            <a:p/>
+            <a:p>
+              <a:endParaRPr/>
+            </a:p>
           </p:txBody>
         </p:sp>
       </p:grpSp>
@@ -6717,7 +6798,9 @@
           <p:txBody>
             <a:bodyPr wrap="square" lIns="0" tIns="0" rIns="0" bIns="0" rtlCol="0"/>
             <a:lstStyle/>
-            <a:p/>
+            <a:p>
+              <a:endParaRPr/>
+            </a:p>
           </p:txBody>
         </p:sp>
         <p:sp>
@@ -6767,7 +6850,9 @@
           <p:txBody>
             <a:bodyPr wrap="square" lIns="0" tIns="0" rIns="0" bIns="0" rtlCol="0"/>
             <a:lstStyle/>
-            <a:p/>
+            <a:p>
+              <a:endParaRPr/>
+            </a:p>
           </p:txBody>
         </p:sp>
         <p:sp>
@@ -6971,7 +7056,9 @@
           <p:txBody>
             <a:bodyPr wrap="square" lIns="0" tIns="0" rIns="0" bIns="0" rtlCol="0"/>
             <a:lstStyle/>
-            <a:p/>
+            <a:p>
+              <a:endParaRPr/>
+            </a:p>
           </p:txBody>
         </p:sp>
       </p:grpSp>
@@ -7008,7 +7095,6 @@
               <a:rPr spc="-5" dirty="0"/>
               <a:t>val1</a:t>
             </a:r>
-            <a:endParaRPr spc="-5" dirty="0"/>
           </a:p>
         </p:txBody>
       </p:sp>
@@ -7117,7 +7203,9 @@
         <p:txBody>
           <a:bodyPr wrap="square" lIns="0" tIns="0" rIns="0" bIns="0" rtlCol="0"/>
           <a:lstStyle/>
-          <a:p/>
+          <a:p>
+            <a:endParaRPr/>
+          </a:p>
         </p:txBody>
       </p:sp>
       <p:sp>
@@ -7225,7 +7313,9 @@
           <p:txBody>
             <a:bodyPr wrap="square" lIns="0" tIns="0" rIns="0" bIns="0" rtlCol="0"/>
             <a:lstStyle/>
-            <a:p/>
+            <a:p>
+              <a:endParaRPr/>
+            </a:p>
           </p:txBody>
         </p:sp>
         <p:sp>
@@ -7275,7 +7365,9 @@
           <p:txBody>
             <a:bodyPr wrap="square" lIns="0" tIns="0" rIns="0" bIns="0" rtlCol="0"/>
             <a:lstStyle/>
-            <a:p/>
+            <a:p>
+              <a:endParaRPr/>
+            </a:p>
           </p:txBody>
         </p:sp>
         <p:sp>
@@ -7479,7 +7571,9 @@
           <p:txBody>
             <a:bodyPr wrap="square" lIns="0" tIns="0" rIns="0" bIns="0" rtlCol="0"/>
             <a:lstStyle/>
-            <a:p/>
+            <a:p>
+              <a:endParaRPr/>
+            </a:p>
           </p:txBody>
         </p:sp>
       </p:grpSp>
@@ -7588,7 +7682,9 @@
           <p:txBody>
             <a:bodyPr wrap="square" lIns="0" tIns="0" rIns="0" bIns="0" rtlCol="0"/>
             <a:lstStyle/>
-            <a:p/>
+            <a:p>
+              <a:endParaRPr/>
+            </a:p>
           </p:txBody>
         </p:sp>
         <p:sp>
@@ -7638,7 +7734,9 @@
           <p:txBody>
             <a:bodyPr wrap="square" lIns="0" tIns="0" rIns="0" bIns="0" rtlCol="0"/>
             <a:lstStyle/>
-            <a:p/>
+            <a:p>
+              <a:endParaRPr/>
+            </a:p>
           </p:txBody>
         </p:sp>
       </p:grpSp>
@@ -7747,7 +7845,9 @@
           <p:txBody>
             <a:bodyPr wrap="square" lIns="0" tIns="0" rIns="0" bIns="0" rtlCol="0"/>
             <a:lstStyle/>
-            <a:p/>
+            <a:p>
+              <a:endParaRPr/>
+            </a:p>
           </p:txBody>
         </p:sp>
         <p:sp>
@@ -7797,7 +7897,9 @@
           <p:txBody>
             <a:bodyPr wrap="square" lIns="0" tIns="0" rIns="0" bIns="0" rtlCol="0"/>
             <a:lstStyle/>
-            <a:p/>
+            <a:p>
+              <a:endParaRPr/>
+            </a:p>
           </p:txBody>
         </p:sp>
       </p:grpSp>
@@ -8068,7 +8170,9 @@
           <p:txBody>
             <a:bodyPr wrap="square" lIns="0" tIns="0" rIns="0" bIns="0" rtlCol="0"/>
             <a:lstStyle/>
-            <a:p/>
+            <a:p>
+              <a:endParaRPr/>
+            </a:p>
           </p:txBody>
         </p:sp>
         <p:sp>
@@ -8278,7 +8382,9 @@
           <p:txBody>
             <a:bodyPr wrap="square" lIns="0" tIns="0" rIns="0" bIns="0" rtlCol="0"/>
             <a:lstStyle/>
-            <a:p/>
+            <a:p>
+              <a:endParaRPr/>
+            </a:p>
           </p:txBody>
         </p:sp>
         <p:sp>
@@ -8388,7 +8494,9 @@
           <p:txBody>
             <a:bodyPr wrap="square" lIns="0" tIns="0" rIns="0" bIns="0" rtlCol="0"/>
             <a:lstStyle/>
-            <a:p/>
+            <a:p>
+              <a:endParaRPr/>
+            </a:p>
           </p:txBody>
         </p:sp>
       </p:grpSp>
@@ -8498,10 +8606,6 @@
               </a:rPr>
               <a:t>20</a:t>
             </a:r>
-            <a:endParaRPr lang="en-US" sz="2000">
-              <a:latin typeface="Courier New" panose="02070309020205020404"/>
-              <a:cs typeface="Courier New" panose="02070309020205020404"/>
-            </a:endParaRPr>
           </a:p>
         </p:txBody>
       </p:sp>
@@ -8612,7 +8716,9 @@
         <p:txBody>
           <a:bodyPr wrap="square" lIns="0" tIns="0" rIns="0" bIns="0" rtlCol="0"/>
           <a:lstStyle/>
-          <a:p/>
+          <a:p>
+            <a:endParaRPr/>
+          </a:p>
         </p:txBody>
       </p:sp>
       <p:sp>
@@ -8657,13 +8763,6 @@
               </a:rPr>
               <a:t>10</a:t>
             </a:r>
-            <a:endParaRPr sz="2000" spc="-5" dirty="0">
-              <a:solidFill>
-                <a:schemeClr val="bg1"/>
-              </a:solidFill>
-              <a:latin typeface="Courier New" panose="02070309020205020404"/>
-              <a:cs typeface="Courier New" panose="02070309020205020404"/>
-            </a:endParaRPr>
           </a:p>
         </p:txBody>
       </p:sp>
@@ -8711,10 +8810,6 @@
               </a:rPr>
               <a:t>10</a:t>
             </a:r>
-            <a:endParaRPr lang="en-US" sz="3000" baseline="1000">
-              <a:latin typeface="Courier New" panose="02070309020205020404"/>
-              <a:cs typeface="Courier New" panose="02070309020205020404"/>
-            </a:endParaRPr>
           </a:p>
         </p:txBody>
       </p:sp>
@@ -8731,9 +8826,11 @@
         <p:spPr/>
         <p:txBody>
           <a:bodyPr/>
+          <a:lstStyle/>
           <a:p>
             <a:fld id="{B6F15528-21DE-4FAA-801E-634DDDAF4B2B}" type="slidenum">
               <a:rPr/>
+              <a:t>11</a:t>
             </a:fld>
             <a:endParaRPr/>
           </a:p>
@@ -8883,7 +8980,7 @@
               </a:rPr>
               <a:t>Flight(10);</a:t>
             </a:r>
-            <a:endParaRPr sz="2000">
+            <a:endParaRPr sz="2000" dirty="0">
               <a:latin typeface="Courier New" panose="02070309020205020404"/>
               <a:cs typeface="Courier New" panose="02070309020205020404"/>
             </a:endParaRPr>
@@ -9004,7 +9101,7 @@
               </a:rPr>
               <a:t>);</a:t>
             </a:r>
-            <a:endParaRPr sz="2000">
+            <a:endParaRPr sz="2000" dirty="0">
               <a:latin typeface="Courier New" panose="02070309020205020404"/>
               <a:cs typeface="Courier New" panose="02070309020205020404"/>
             </a:endParaRPr>
@@ -9766,7 +9863,9 @@
         <p:txBody>
           <a:bodyPr wrap="square" lIns="0" tIns="0" rIns="0" bIns="0" rtlCol="0"/>
           <a:lstStyle/>
-          <a:p/>
+          <a:p>
+            <a:endParaRPr/>
+          </a:p>
         </p:txBody>
       </p:sp>
       <p:sp>
@@ -9874,7 +9973,9 @@
           <p:txBody>
             <a:bodyPr wrap="square" lIns="0" tIns="0" rIns="0" bIns="0" rtlCol="0"/>
             <a:lstStyle/>
-            <a:p/>
+            <a:p>
+              <a:endParaRPr/>
+            </a:p>
           </p:txBody>
         </p:sp>
         <p:sp>
@@ -9924,7 +10025,9 @@
           <p:txBody>
             <a:bodyPr wrap="square" lIns="0" tIns="0" rIns="0" bIns="0" rtlCol="0"/>
             <a:lstStyle/>
-            <a:p/>
+            <a:p>
+              <a:endParaRPr/>
+            </a:p>
           </p:txBody>
         </p:sp>
         <p:sp>
@@ -10128,7 +10231,9 @@
           <p:txBody>
             <a:bodyPr wrap="square" lIns="0" tIns="0" rIns="0" bIns="0" rtlCol="0"/>
             <a:lstStyle/>
-            <a:p/>
+            <a:p>
+              <a:endParaRPr/>
+            </a:p>
           </p:txBody>
         </p:sp>
       </p:grpSp>
@@ -10165,7 +10270,6 @@
               <a:rPr spc="-5" dirty="0"/>
               <a:t>val1</a:t>
             </a:r>
-            <a:endParaRPr spc="-5" dirty="0"/>
           </a:p>
         </p:txBody>
       </p:sp>
@@ -10274,7 +10378,9 @@
         <p:txBody>
           <a:bodyPr wrap="square" lIns="0" tIns="0" rIns="0" bIns="0" rtlCol="0"/>
           <a:lstStyle/>
-          <a:p/>
+          <a:p>
+            <a:endParaRPr/>
+          </a:p>
         </p:txBody>
       </p:sp>
       <p:sp>
@@ -10382,7 +10488,9 @@
           <p:txBody>
             <a:bodyPr wrap="square" lIns="0" tIns="0" rIns="0" bIns="0" rtlCol="0"/>
             <a:lstStyle/>
-            <a:p/>
+            <a:p>
+              <a:endParaRPr/>
+            </a:p>
           </p:txBody>
         </p:sp>
         <p:sp>
@@ -10432,7 +10540,9 @@
           <p:txBody>
             <a:bodyPr wrap="square" lIns="0" tIns="0" rIns="0" bIns="0" rtlCol="0"/>
             <a:lstStyle/>
-            <a:p/>
+            <a:p>
+              <a:endParaRPr/>
+            </a:p>
           </p:txBody>
         </p:sp>
         <p:sp>
@@ -10636,7 +10746,9 @@
           <p:txBody>
             <a:bodyPr wrap="square" lIns="0" tIns="0" rIns="0" bIns="0" rtlCol="0"/>
             <a:lstStyle/>
-            <a:p/>
+            <a:p>
+              <a:endParaRPr/>
+            </a:p>
           </p:txBody>
         </p:sp>
       </p:grpSp>
@@ -10845,7 +10957,9 @@
         <p:txBody>
           <a:bodyPr wrap="square" lIns="0" tIns="0" rIns="0" bIns="0" rtlCol="0"/>
           <a:lstStyle/>
-          <a:p/>
+          <a:p>
+            <a:endParaRPr/>
+          </a:p>
         </p:txBody>
       </p:sp>
       <p:sp>
@@ -10861,9 +10975,11 @@
         <p:spPr/>
         <p:txBody>
           <a:bodyPr/>
+          <a:lstStyle/>
           <a:p>
             <a:fld id="{B6F15528-21DE-4FAA-801E-634DDDAF4B2B}" type="slidenum">
               <a:rPr/>
+              <a:t>12</a:t>
             </a:fld>
             <a:endParaRPr/>
           </a:p>
@@ -11896,7 +12012,9 @@
         <p:txBody>
           <a:bodyPr wrap="square" lIns="0" tIns="0" rIns="0" bIns="0" rtlCol="0"/>
           <a:lstStyle/>
-          <a:p/>
+          <a:p>
+            <a:endParaRPr/>
+          </a:p>
         </p:txBody>
       </p:sp>
       <p:sp>
@@ -12004,7 +12122,9 @@
           <p:txBody>
             <a:bodyPr wrap="square" lIns="0" tIns="0" rIns="0" bIns="0" rtlCol="0"/>
             <a:lstStyle/>
-            <a:p/>
+            <a:p>
+              <a:endParaRPr/>
+            </a:p>
           </p:txBody>
         </p:sp>
         <p:sp>
@@ -12054,7 +12174,9 @@
           <p:txBody>
             <a:bodyPr wrap="square" lIns="0" tIns="0" rIns="0" bIns="0" rtlCol="0"/>
             <a:lstStyle/>
-            <a:p/>
+            <a:p>
+              <a:endParaRPr/>
+            </a:p>
           </p:txBody>
         </p:sp>
         <p:sp>
@@ -12258,7 +12380,9 @@
           <p:txBody>
             <a:bodyPr wrap="square" lIns="0" tIns="0" rIns="0" bIns="0" rtlCol="0"/>
             <a:lstStyle/>
-            <a:p/>
+            <a:p>
+              <a:endParaRPr/>
+            </a:p>
           </p:txBody>
         </p:sp>
       </p:grpSp>
@@ -12295,7 +12419,6 @@
               <a:rPr spc="-5" dirty="0"/>
               <a:t>val1</a:t>
             </a:r>
-            <a:endParaRPr spc="-5" dirty="0"/>
           </a:p>
         </p:txBody>
       </p:sp>
@@ -12404,7 +12527,9 @@
         <p:txBody>
           <a:bodyPr wrap="square" lIns="0" tIns="0" rIns="0" bIns="0" rtlCol="0"/>
           <a:lstStyle/>
-          <a:p/>
+          <a:p>
+            <a:endParaRPr/>
+          </a:p>
         </p:txBody>
       </p:sp>
       <p:sp>
@@ -12512,7 +12637,9 @@
           <p:txBody>
             <a:bodyPr wrap="square" lIns="0" tIns="0" rIns="0" bIns="0" rtlCol="0"/>
             <a:lstStyle/>
-            <a:p/>
+            <a:p>
+              <a:endParaRPr/>
+            </a:p>
           </p:txBody>
         </p:sp>
         <p:sp>
@@ -12562,7 +12689,9 @@
           <p:txBody>
             <a:bodyPr wrap="square" lIns="0" tIns="0" rIns="0" bIns="0" rtlCol="0"/>
             <a:lstStyle/>
-            <a:p/>
+            <a:p>
+              <a:endParaRPr/>
+            </a:p>
           </p:txBody>
         </p:sp>
         <p:sp>
@@ -12766,7 +12895,9 @@
           <p:txBody>
             <a:bodyPr wrap="square" lIns="0" tIns="0" rIns="0" bIns="0" rtlCol="0"/>
             <a:lstStyle/>
-            <a:p/>
+            <a:p>
+              <a:endParaRPr/>
+            </a:p>
           </p:txBody>
         </p:sp>
       </p:grpSp>
@@ -12975,7 +13106,9 @@
         <p:txBody>
           <a:bodyPr wrap="square" lIns="0" tIns="0" rIns="0" bIns="0" rtlCol="0"/>
           <a:lstStyle/>
-          <a:p/>
+          <a:p>
+            <a:endParaRPr/>
+          </a:p>
         </p:txBody>
       </p:sp>
       <p:sp>
@@ -12991,9 +13124,11 @@
         <p:spPr/>
         <p:txBody>
           <a:bodyPr/>
+          <a:lstStyle/>
           <a:p>
             <a:fld id="{B6F15528-21DE-4FAA-801E-634DDDAF4B2B}" type="slidenum">
               <a:rPr/>
+              <a:t>13</a:t>
             </a:fld>
             <a:endParaRPr/>
           </a:p>
@@ -13008,7 +13143,7 @@
           <p:nvPr/>
         </p:nvPicPr>
         <p:blipFill>
-          <a:blip r:embed="rId1"/>
+          <a:blip r:embed="rId2"/>
           <a:stretch>
             <a:fillRect/>
           </a:stretch>
@@ -13085,7 +13220,9 @@
         <p:txBody>
           <a:bodyPr wrap="square" lIns="0" tIns="0" rIns="0" bIns="0" rtlCol="0"/>
           <a:lstStyle/>
-          <a:p/>
+          <a:p>
+            <a:endParaRPr/>
+          </a:p>
         </p:txBody>
       </p:sp>
       <p:sp>
@@ -13484,7 +13621,7 @@
           <p:nvPr/>
         </p:nvPicPr>
         <p:blipFill>
-          <a:blip r:embed="rId1" cstate="print"/>
+          <a:blip r:embed="rId2" cstate="print"/>
           <a:stretch>
             <a:fillRect/>
           </a:stretch>
@@ -13512,9 +13649,11 @@
         <p:spPr/>
         <p:txBody>
           <a:bodyPr/>
+          <a:lstStyle/>
           <a:p>
             <a:fld id="{B6F15528-21DE-4FAA-801E-634DDDAF4B2B}" type="slidenum">
               <a:rPr/>
+              <a:t>14</a:t>
             </a:fld>
             <a:endParaRPr/>
           </a:p>
@@ -13590,7 +13729,9 @@
         <p:txBody>
           <a:bodyPr wrap="square" lIns="0" tIns="0" rIns="0" bIns="0" rtlCol="0"/>
           <a:lstStyle/>
-          <a:p/>
+          <a:p>
+            <a:endParaRPr/>
+          </a:p>
         </p:txBody>
       </p:sp>
       <p:sp>
@@ -14354,9 +14495,11 @@
         <p:spPr/>
         <p:txBody>
           <a:bodyPr/>
+          <a:lstStyle/>
           <a:p>
             <a:fld id="{B6F15528-21DE-4FAA-801E-634DDDAF4B2B}" type="slidenum">
               <a:rPr/>
+              <a:t>15</a:t>
             </a:fld>
             <a:endParaRPr/>
           </a:p>
@@ -14444,7 +14587,7 @@
           <p:nvPr/>
         </p:nvPicPr>
         <p:blipFill>
-          <a:blip r:embed="rId1" cstate="print"/>
+          <a:blip r:embed="rId2" cstate="print"/>
           <a:stretch>
             <a:fillRect/>
           </a:stretch>
@@ -14556,7 +14699,6 @@
               <a:rPr spc="-5" dirty="0"/>
               <a:t>signature</a:t>
             </a:r>
-            <a:endParaRPr spc="-5" dirty="0"/>
           </a:p>
           <a:p>
             <a:pPr marL="978535">
@@ -14617,7 +14759,7 @@
           <p:nvPr/>
         </p:nvPicPr>
         <p:blipFill>
-          <a:blip r:embed="rId2" cstate="print"/>
+          <a:blip r:embed="rId3" cstate="print"/>
           <a:stretch>
             <a:fillRect/>
           </a:stretch>
@@ -14677,7 +14819,9 @@
         <p:txBody>
           <a:bodyPr wrap="square" lIns="0" tIns="0" rIns="0" bIns="0" rtlCol="0"/>
           <a:lstStyle/>
-          <a:p/>
+          <a:p>
+            <a:endParaRPr/>
+          </a:p>
         </p:txBody>
       </p:sp>
       <p:sp>
@@ -14693,9 +14837,11 @@
         <p:spPr/>
         <p:txBody>
           <a:bodyPr/>
+          <a:lstStyle/>
           <a:p>
             <a:fld id="{B6F15528-21DE-4FAA-801E-634DDDAF4B2B}" type="slidenum">
               <a:rPr/>
+              <a:t>16</a:t>
             </a:fld>
             <a:endParaRPr/>
           </a:p>
@@ -14771,7 +14917,9 @@
         <p:txBody>
           <a:bodyPr wrap="square" lIns="0" tIns="0" rIns="0" bIns="0" rtlCol="0"/>
           <a:lstStyle/>
-          <a:p/>
+          <a:p>
+            <a:endParaRPr/>
+          </a:p>
         </p:txBody>
       </p:sp>
       <p:sp>
@@ -15622,7 +15770,9 @@
         <p:txBody>
           <a:bodyPr wrap="square" lIns="0" tIns="0" rIns="0" bIns="0" rtlCol="0"/>
           <a:lstStyle/>
-          <a:p/>
+          <a:p>
+            <a:endParaRPr/>
+          </a:p>
         </p:txBody>
       </p:sp>
       <p:sp>
@@ -15638,9 +15788,11 @@
         <p:spPr/>
         <p:txBody>
           <a:bodyPr/>
+          <a:lstStyle/>
           <a:p>
             <a:fld id="{B6F15528-21DE-4FAA-801E-634DDDAF4B2B}" type="slidenum">
               <a:rPr/>
+              <a:t>17</a:t>
             </a:fld>
             <a:endParaRPr/>
           </a:p>
@@ -15728,7 +15880,7 @@
           <p:nvPr/>
         </p:nvPicPr>
         <p:blipFill>
-          <a:blip r:embed="rId1" cstate="print"/>
+          <a:blip r:embed="rId2" cstate="print"/>
           <a:stretch>
             <a:fillRect/>
           </a:stretch>
@@ -15840,7 +15992,6 @@
               <a:rPr spc="-5" dirty="0"/>
               <a:t>signature</a:t>
             </a:r>
-            <a:endParaRPr spc="-5" dirty="0"/>
           </a:p>
           <a:p>
             <a:pPr marL="978535">
@@ -16007,7 +16158,7 @@
           <p:nvPr/>
         </p:nvPicPr>
         <p:blipFill>
-          <a:blip r:embed="rId2" cstate="print"/>
+          <a:blip r:embed="rId3" cstate="print"/>
           <a:stretch>
             <a:fillRect/>
           </a:stretch>
@@ -16029,7 +16180,7 @@
           <p:nvPr/>
         </p:nvPicPr>
         <p:blipFill>
-          <a:blip r:embed="rId3" cstate="print"/>
+          <a:blip r:embed="rId4" cstate="print"/>
           <a:stretch>
             <a:fillRect/>
           </a:stretch>
@@ -16089,7 +16240,9 @@
         <p:txBody>
           <a:bodyPr wrap="square" lIns="0" tIns="0" rIns="0" bIns="0" rtlCol="0"/>
           <a:lstStyle/>
-          <a:p/>
+          <a:p>
+            <a:endParaRPr/>
+          </a:p>
         </p:txBody>
       </p:sp>
       <p:sp>
@@ -16105,9 +16258,11 @@
         <p:spPr/>
         <p:txBody>
           <a:bodyPr/>
+          <a:lstStyle/>
           <a:p>
             <a:fld id="{B6F15528-21DE-4FAA-801E-634DDDAF4B2B}" type="slidenum">
               <a:rPr/>
+              <a:t>18</a:t>
             </a:fld>
             <a:endParaRPr/>
           </a:p>
@@ -16183,7 +16338,9 @@
         <p:txBody>
           <a:bodyPr wrap="square" lIns="0" tIns="0" rIns="0" bIns="0" rtlCol="0"/>
           <a:lstStyle/>
-          <a:p/>
+          <a:p>
+            <a:endParaRPr/>
+          </a:p>
         </p:txBody>
       </p:sp>
       <p:sp>
@@ -16981,7 +17138,9 @@
         <p:txBody>
           <a:bodyPr wrap="square" lIns="0" tIns="0" rIns="0" bIns="0" rtlCol="0"/>
           <a:lstStyle/>
-          <a:p/>
+          <a:p>
+            <a:endParaRPr/>
+          </a:p>
         </p:txBody>
       </p:sp>
       <p:sp>
@@ -17031,7 +17190,9 @@
         <p:txBody>
           <a:bodyPr wrap="square" lIns="0" tIns="0" rIns="0" bIns="0" rtlCol="0"/>
           <a:lstStyle/>
-          <a:p/>
+          <a:p>
+            <a:endParaRPr/>
+          </a:p>
         </p:txBody>
       </p:sp>
       <p:sp>
@@ -17047,9 +17208,11 @@
         <p:spPr/>
         <p:txBody>
           <a:bodyPr/>
+          <a:lstStyle/>
           <a:p>
             <a:fld id="{B6F15528-21DE-4FAA-801E-634DDDAF4B2B}" type="slidenum">
               <a:rPr/>
+              <a:t>19</a:t>
             </a:fld>
             <a:endParaRPr/>
           </a:p>
@@ -17087,7 +17250,7 @@
           <p:nvPr/>
         </p:nvPicPr>
         <p:blipFill>
-          <a:blip r:embed="rId1" cstate="print"/>
+          <a:blip r:embed="rId2" cstate="print"/>
           <a:stretch>
             <a:fillRect/>
           </a:stretch>
@@ -17536,9 +17699,11 @@
         <p:spPr/>
         <p:txBody>
           <a:bodyPr/>
+          <a:lstStyle/>
           <a:p>
             <a:fld id="{B6F15528-21DE-4FAA-801E-634DDDAF4B2B}" type="slidenum">
               <a:rPr/>
+              <a:t>2</a:t>
             </a:fld>
             <a:endParaRPr/>
           </a:p>
@@ -17626,7 +17791,7 @@
           <p:nvPr/>
         </p:nvPicPr>
         <p:blipFill>
-          <a:blip r:embed="rId1" cstate="print"/>
+          <a:blip r:embed="rId2" cstate="print"/>
           <a:stretch>
             <a:fillRect/>
           </a:stretch>
@@ -17738,7 +17903,6 @@
               <a:rPr spc="-5" dirty="0"/>
               <a:t>signature</a:t>
             </a:r>
-            <a:endParaRPr spc="-5" dirty="0"/>
           </a:p>
           <a:p>
             <a:pPr marL="978535">
@@ -17971,7 +18135,7 @@
           <p:nvPr/>
         </p:nvPicPr>
         <p:blipFill>
-          <a:blip r:embed="rId2" cstate="print"/>
+          <a:blip r:embed="rId3" cstate="print"/>
           <a:stretch>
             <a:fillRect/>
           </a:stretch>
@@ -17993,7 +18157,7 @@
           <p:nvPr/>
         </p:nvPicPr>
         <p:blipFill>
-          <a:blip r:embed="rId3" cstate="print"/>
+          <a:blip r:embed="rId4" cstate="print"/>
           <a:stretch>
             <a:fillRect/>
           </a:stretch>
@@ -18015,7 +18179,7 @@
           <p:nvPr/>
         </p:nvPicPr>
         <p:blipFill>
-          <a:blip r:embed="rId4" cstate="print"/>
+          <a:blip r:embed="rId5" cstate="print"/>
           <a:stretch>
             <a:fillRect/>
           </a:stretch>
@@ -18075,7 +18239,9 @@
         <p:txBody>
           <a:bodyPr wrap="square" lIns="0" tIns="0" rIns="0" bIns="0" rtlCol="0"/>
           <a:lstStyle/>
-          <a:p/>
+          <a:p>
+            <a:endParaRPr/>
+          </a:p>
         </p:txBody>
       </p:sp>
       <p:sp>
@@ -18091,9 +18257,11 @@
         <p:spPr/>
         <p:txBody>
           <a:bodyPr/>
+          <a:lstStyle/>
           <a:p>
             <a:fld id="{B6F15528-21DE-4FAA-801E-634DDDAF4B2B}" type="slidenum">
               <a:rPr/>
+              <a:t>20</a:t>
             </a:fld>
             <a:endParaRPr/>
           </a:p>
@@ -18197,11 +18365,6 @@
               </a:rPr>
               <a:t>{</a:t>
             </a:r>
-            <a:endParaRPr dirty="0">
-              <a:solidFill>
-                <a:srgbClr val="F2F2F2"/>
-              </a:solidFill>
-            </a:endParaRPr>
           </a:p>
           <a:p>
             <a:pPr marL="316865" marR="5080">
@@ -18305,11 +18468,6 @@
               </a:rPr>
               <a:t>{</a:t>
             </a:r>
-            <a:endParaRPr dirty="0">
-              <a:solidFill>
-                <a:srgbClr val="F2F2F2"/>
-              </a:solidFill>
-            </a:endParaRPr>
           </a:p>
         </p:txBody>
       </p:sp>
@@ -18843,7 +19001,9 @@
         <p:txBody>
           <a:bodyPr wrap="square" lIns="0" tIns="0" rIns="0" bIns="0" rtlCol="0"/>
           <a:lstStyle/>
-          <a:p/>
+          <a:p>
+            <a:endParaRPr/>
+          </a:p>
         </p:txBody>
       </p:sp>
       <p:sp>
@@ -18859,9 +19019,11 @@
         <p:spPr/>
         <p:txBody>
           <a:bodyPr/>
+          <a:lstStyle/>
           <a:p>
             <a:fld id="{B6F15528-21DE-4FAA-801E-634DDDAF4B2B}" type="slidenum">
               <a:rPr/>
+              <a:t>21</a:t>
             </a:fld>
             <a:endParaRPr/>
           </a:p>
@@ -18965,11 +19127,6 @@
               </a:rPr>
               <a:t>{</a:t>
             </a:r>
-            <a:endParaRPr dirty="0">
-              <a:solidFill>
-                <a:srgbClr val="F2F2F2"/>
-              </a:solidFill>
-            </a:endParaRPr>
           </a:p>
           <a:p>
             <a:pPr marL="316865" marR="5080">
@@ -19073,11 +19230,6 @@
               </a:rPr>
               <a:t>{</a:t>
             </a:r>
-            <a:endParaRPr dirty="0">
-              <a:solidFill>
-                <a:srgbClr val="F2F2F2"/>
-              </a:solidFill>
-            </a:endParaRPr>
           </a:p>
         </p:txBody>
       </p:sp>
@@ -19557,9 +19709,11 @@
         <p:spPr/>
         <p:txBody>
           <a:bodyPr/>
+          <a:lstStyle/>
           <a:p>
             <a:fld id="{B6F15528-21DE-4FAA-801E-634DDDAF4B2B}" type="slidenum">
               <a:rPr/>
+              <a:t>22</a:t>
             </a:fld>
             <a:endParaRPr/>
           </a:p>
@@ -19663,11 +19817,6 @@
               </a:rPr>
               <a:t>{</a:t>
             </a:r>
-            <a:endParaRPr dirty="0">
-              <a:solidFill>
-                <a:srgbClr val="F2F2F2"/>
-              </a:solidFill>
-            </a:endParaRPr>
           </a:p>
           <a:p>
             <a:pPr marL="316865" marR="5080">
@@ -19779,11 +19928,6 @@
               </a:rPr>
               <a:t>{</a:t>
             </a:r>
-            <a:endParaRPr dirty="0">
-              <a:solidFill>
-                <a:srgbClr val="F2F2F2"/>
-              </a:solidFill>
-            </a:endParaRPr>
           </a:p>
         </p:txBody>
       </p:sp>
@@ -20263,9 +20407,11 @@
         <p:spPr/>
         <p:txBody>
           <a:bodyPr/>
+          <a:lstStyle/>
           <a:p>
             <a:fld id="{B6F15528-21DE-4FAA-801E-634DDDAF4B2B}" type="slidenum">
               <a:rPr/>
+              <a:t>23</a:t>
             </a:fld>
             <a:endParaRPr/>
           </a:p>
@@ -20288,7 +20434,14 @@
         <p:cNvGrpSpPr/>
         <p:nvPr/>
       </p:nvGrpSpPr>
-      <p:grpSpPr/>
+      <p:grpSpPr>
+        <a:xfrm>
+          <a:off x="0" y="0"/>
+          <a:ext cx="0" cy="0"/>
+          <a:chOff x="0" y="0"/>
+          <a:chExt cx="0" cy="0"/>
+        </a:xfrm>
+      </p:grpSpPr>
       <p:sp>
         <p:nvSpPr>
           <p:cNvPr id="6" name="Title 5"/>
@@ -20302,6 +20455,7 @@
         <p:spPr/>
         <p:txBody>
           <a:bodyPr/>
+          <a:lstStyle/>
           <a:p>
             <a:endParaRPr lang="en-US"/>
           </a:p>
@@ -20320,9 +20474,11 @@
         <p:spPr/>
         <p:txBody>
           <a:bodyPr/>
+          <a:lstStyle/>
           <a:p>
             <a:fld id="{B6F15528-21DE-4FAA-801E-634DDDAF4B2B}" type="slidenum">
               <a:rPr/>
+              <a:t>24</a:t>
             </a:fld>
             <a:endParaRPr/>
           </a:p>
@@ -20341,6 +20497,7 @@
         <p:spPr/>
         <p:txBody>
           <a:bodyPr/>
+          <a:lstStyle/>
           <a:p>
             <a:endParaRPr lang="en-US"/>
           </a:p>
@@ -20350,14 +20507,14 @@
         <p:nvPicPr>
           <p:cNvPr id="5" name="Content Placeholder 4"/>
           <p:cNvPicPr>
-            <a:picLocks noChangeAspect="1"/>
+            <a:picLocks noGrp="1" noChangeAspect="1"/>
           </p:cNvPicPr>
           <p:nvPr>
             <p:ph sz="half" idx="2"/>
           </p:nvPr>
         </p:nvPicPr>
         <p:blipFill>
-          <a:blip r:embed="rId1"/>
+          <a:blip r:embed="rId2"/>
           <a:srcRect b="2454"/>
           <a:stretch>
             <a:fillRect/>
@@ -20495,11 +20652,6 @@
               </a:rPr>
               <a:t>{</a:t>
             </a:r>
-            <a:endParaRPr dirty="0">
-              <a:solidFill>
-                <a:srgbClr val="F2F2F2"/>
-              </a:solidFill>
-            </a:endParaRPr>
           </a:p>
           <a:p>
             <a:pPr marL="316865">
@@ -20518,11 +20670,6 @@
               </a:rPr>
               <a:t>if(hasSeating())</a:t>
             </a:r>
-            <a:endParaRPr spc="-5" dirty="0">
-              <a:solidFill>
-                <a:srgbClr val="F2F2F2"/>
-              </a:solidFill>
-            </a:endParaRPr>
           </a:p>
         </p:txBody>
       </p:sp>
@@ -20925,9 +21072,11 @@
         <p:spPr/>
         <p:txBody>
           <a:bodyPr/>
+          <a:lstStyle/>
           <a:p>
             <a:fld id="{B6F15528-21DE-4FAA-801E-634DDDAF4B2B}" type="slidenum">
               <a:rPr/>
+              <a:t>25</a:t>
             </a:fld>
             <a:endParaRPr/>
           </a:p>
@@ -21071,11 +21220,6 @@
               </a:rPr>
               <a:t>{</a:t>
             </a:r>
-            <a:endParaRPr dirty="0">
-              <a:solidFill>
-                <a:srgbClr val="F2F2F2"/>
-              </a:solidFill>
-            </a:endParaRPr>
           </a:p>
           <a:p>
             <a:pPr marL="316865">
@@ -21102,11 +21246,6 @@
               </a:rPr>
               <a:t>(p.getCheckedBags());</a:t>
             </a:r>
-            <a:endParaRPr spc="-5" dirty="0">
-              <a:solidFill>
-                <a:srgbClr val="F2F2F2"/>
-              </a:solidFill>
-            </a:endParaRPr>
           </a:p>
         </p:txBody>
       </p:sp>
@@ -21492,9 +21631,11 @@
         <p:spPr/>
         <p:txBody>
           <a:bodyPr/>
+          <a:lstStyle/>
           <a:p>
             <a:fld id="{B6F15528-21DE-4FAA-801E-634DDDAF4B2B}" type="slidenum">
               <a:rPr/>
+              <a:t>26</a:t>
             </a:fld>
             <a:endParaRPr/>
           </a:p>
@@ -21612,7 +21753,6 @@
               <a:rPr spc="-45" dirty="0"/>
               <a:t>Main.java</a:t>
             </a:r>
-            <a:endParaRPr spc="-45" dirty="0"/>
           </a:p>
           <a:p>
             <a:pPr>
@@ -22217,7 +22357,9 @@
         <p:txBody>
           <a:bodyPr wrap="square" lIns="0" tIns="0" rIns="0" bIns="0" rtlCol="0"/>
           <a:lstStyle/>
-          <a:p/>
+          <a:p>
+            <a:endParaRPr/>
+          </a:p>
         </p:txBody>
       </p:sp>
       <p:sp>
@@ -22233,9 +22375,11 @@
         <p:spPr/>
         <p:txBody>
           <a:bodyPr/>
+          <a:lstStyle/>
           <a:p>
             <a:fld id="{B6F15528-21DE-4FAA-801E-634DDDAF4B2B}" type="slidenum">
               <a:rPr/>
+              <a:t>27</a:t>
             </a:fld>
             <a:endParaRPr/>
           </a:p>
@@ -22353,7 +22497,6 @@
               <a:rPr spc="-45" dirty="0"/>
               <a:t>Main.java</a:t>
             </a:r>
-            <a:endParaRPr spc="-45" dirty="0"/>
           </a:p>
           <a:p>
             <a:pPr>
@@ -23118,7 +23261,9 @@
         <p:txBody>
           <a:bodyPr wrap="square" lIns="0" tIns="0" rIns="0" bIns="0" rtlCol="0"/>
           <a:lstStyle/>
-          <a:p/>
+          <a:p>
+            <a:endParaRPr/>
+          </a:p>
         </p:txBody>
       </p:sp>
       <p:sp>
@@ -23134,9 +23279,11 @@
         <p:spPr/>
         <p:txBody>
           <a:bodyPr/>
+          <a:lstStyle/>
           <a:p>
             <a:fld id="{B6F15528-21DE-4FAA-801E-634DDDAF4B2B}" type="slidenum">
               <a:rPr/>
+              <a:t>28</a:t>
             </a:fld>
             <a:endParaRPr/>
           </a:p>
@@ -23250,7 +23397,6 @@
               <a:rPr spc="-45" dirty="0"/>
               <a:t>Main.java</a:t>
             </a:r>
-            <a:endParaRPr spc="-45" dirty="0"/>
           </a:p>
           <a:p>
             <a:pPr>
@@ -24167,7 +24313,9 @@
         <p:txBody>
           <a:bodyPr wrap="square" lIns="0" tIns="0" rIns="0" bIns="0" rtlCol="0"/>
           <a:lstStyle/>
-          <a:p/>
+          <a:p>
+            <a:endParaRPr/>
+          </a:p>
         </p:txBody>
       </p:sp>
       <p:sp>
@@ -24183,9 +24331,11 @@
         <p:spPr/>
         <p:txBody>
           <a:bodyPr/>
+          <a:lstStyle/>
           <a:p>
             <a:fld id="{B6F15528-21DE-4FAA-801E-634DDDAF4B2B}" type="slidenum">
               <a:rPr/>
+              <a:t>29</a:t>
             </a:fld>
             <a:endParaRPr/>
           </a:p>
@@ -24223,7 +24373,7 @@
           <p:nvPr/>
         </p:nvPicPr>
         <p:blipFill>
-          <a:blip r:embed="rId1" cstate="print"/>
+          <a:blip r:embed="rId2" cstate="print"/>
           <a:stretch>
             <a:fillRect/>
           </a:stretch>
@@ -24245,7 +24395,7 @@
           <p:nvPr/>
         </p:nvPicPr>
         <p:blipFill>
-          <a:blip r:embed="rId2" cstate="print"/>
+          <a:blip r:embed="rId3" cstate="print"/>
           <a:stretch>
             <a:fillRect/>
           </a:stretch>
@@ -24823,9 +24973,11 @@
         <p:spPr/>
         <p:txBody>
           <a:bodyPr/>
+          <a:lstStyle/>
           <a:p>
             <a:fld id="{B6F15528-21DE-4FAA-801E-634DDDAF4B2B}" type="slidenum">
               <a:rPr/>
+              <a:t>3</a:t>
             </a:fld>
             <a:endParaRPr/>
           </a:p>
@@ -25862,7 +26014,9 @@
         <p:txBody>
           <a:bodyPr wrap="square" lIns="0" tIns="0" rIns="0" bIns="0" rtlCol="0"/>
           <a:lstStyle/>
-          <a:p/>
+          <a:p>
+            <a:endParaRPr/>
+          </a:p>
         </p:txBody>
       </p:sp>
       <p:sp>
@@ -25878,9 +26032,11 @@
         <p:spPr/>
         <p:txBody>
           <a:bodyPr/>
+          <a:lstStyle/>
           <a:p>
             <a:fld id="{B6F15528-21DE-4FAA-801E-634DDDAF4B2B}" type="slidenum">
               <a:rPr/>
+              <a:t>30</a:t>
             </a:fld>
             <a:endParaRPr/>
           </a:p>
@@ -26999,7 +27155,9 @@
         <p:txBody>
           <a:bodyPr wrap="square" lIns="0" tIns="0" rIns="0" bIns="0" rtlCol="0"/>
           <a:lstStyle/>
-          <a:p/>
+          <a:p>
+            <a:endParaRPr/>
+          </a:p>
         </p:txBody>
       </p:sp>
       <p:sp>
@@ -27015,9 +27173,11 @@
         <p:spPr/>
         <p:txBody>
           <a:bodyPr/>
+          <a:lstStyle/>
           <a:p>
             <a:fld id="{B6F15528-21DE-4FAA-801E-634DDDAF4B2B}" type="slidenum">
               <a:rPr/>
+              <a:t>31</a:t>
             </a:fld>
             <a:endParaRPr/>
           </a:p>
@@ -27169,11 +27329,6 @@
               </a:rPr>
               <a:t>{</a:t>
             </a:r>
-            <a:endParaRPr dirty="0">
-              <a:solidFill>
-                <a:srgbClr val="F2F2F2"/>
-              </a:solidFill>
-            </a:endParaRPr>
           </a:p>
           <a:p>
             <a:pPr marL="316865">
@@ -27240,11 +27395,6 @@
               </a:rPr>
               <a:t>{</a:t>
             </a:r>
-            <a:endParaRPr dirty="0">
-              <a:solidFill>
-                <a:srgbClr val="F2F2F2"/>
-              </a:solidFill>
-            </a:endParaRPr>
           </a:p>
         </p:txBody>
       </p:sp>
@@ -27337,7 +27487,7 @@
               </a:rPr>
               <a:t>.length;</a:t>
             </a:r>
-            <a:endParaRPr sz="2000">
+            <a:endParaRPr sz="2000" dirty="0">
               <a:latin typeface="Courier New" panose="02070309020205020404"/>
               <a:cs typeface="Courier New" panose="02070309020205020404"/>
             </a:endParaRPr>
@@ -27508,7 +27658,7 @@
               </a:rPr>
               <a:t>passenger.getCheckedBags();</a:t>
             </a:r>
-            <a:endParaRPr sz="2000">
+            <a:endParaRPr sz="2000" dirty="0">
               <a:latin typeface="Courier New" panose="02070309020205020404"/>
               <a:cs typeface="Courier New" panose="02070309020205020404"/>
             </a:endParaRPr>
@@ -27532,7 +27682,7 @@
               </a:rPr>
               <a:t>}</a:t>
             </a:r>
-            <a:endParaRPr sz="2000">
+            <a:endParaRPr sz="2000" dirty="0">
               <a:latin typeface="Courier New" panose="02070309020205020404"/>
               <a:cs typeface="Courier New" panose="02070309020205020404"/>
             </a:endParaRPr>
@@ -27556,7 +27706,7 @@
               </a:rPr>
               <a:t>}</a:t>
             </a:r>
-            <a:endParaRPr sz="2000">
+            <a:endParaRPr sz="2000" dirty="0">
               <a:latin typeface="Courier New" panose="02070309020205020404"/>
               <a:cs typeface="Courier New" panose="02070309020205020404"/>
             </a:endParaRPr>
@@ -27710,7 +27860,7 @@
               </a:rPr>
               <a:t>seats;</a:t>
             </a:r>
-            <a:endParaRPr sz="2000">
+            <a:endParaRPr sz="2000" dirty="0">
               <a:latin typeface="Courier New" panose="02070309020205020404"/>
               <a:cs typeface="Courier New" panose="02070309020205020404"/>
             </a:endParaRPr>
@@ -27734,7 +27884,7 @@
               </a:rPr>
               <a:t>}</a:t>
             </a:r>
-            <a:endParaRPr sz="2000">
+            <a:endParaRPr sz="2000" dirty="0">
               <a:latin typeface="Courier New" panose="02070309020205020404"/>
               <a:cs typeface="Courier New" panose="02070309020205020404"/>
             </a:endParaRPr>
@@ -27800,9 +27950,11 @@
         <p:spPr/>
         <p:txBody>
           <a:bodyPr/>
+          <a:lstStyle/>
           <a:p>
             <a:fld id="{B6F15528-21DE-4FAA-801E-634DDDAF4B2B}" type="slidenum">
               <a:rPr/>
+              <a:t>32</a:t>
             </a:fld>
             <a:endParaRPr/>
           </a:p>
@@ -27938,11 +28090,6 @@
               </a:rPr>
               <a:t>Flight();</a:t>
             </a:r>
-            <a:endParaRPr spc="-5" dirty="0">
-              <a:solidFill>
-                <a:srgbClr val="F2F2F2"/>
-              </a:solidFill>
-            </a:endParaRPr>
           </a:p>
         </p:txBody>
       </p:sp>
@@ -28085,7 +28232,7 @@
               </a:rPr>
               <a:t>1);</a:t>
             </a:r>
-            <a:endParaRPr sz="2000">
+            <a:endParaRPr sz="2000" dirty="0">
               <a:latin typeface="Courier New" panose="02070309020205020404"/>
               <a:cs typeface="Courier New" panose="02070309020205020404"/>
             </a:endParaRPr>
@@ -28266,7 +28413,7 @@
               </a:rPr>
               <a:t>);</a:t>
             </a:r>
-            <a:endParaRPr sz="2000">
+            <a:endParaRPr sz="2000" dirty="0">
               <a:latin typeface="Courier New" panose="02070309020205020404"/>
               <a:cs typeface="Courier New" panose="02070309020205020404"/>
             </a:endParaRPr>
@@ -28490,7 +28637,7 @@
               </a:rPr>
               <a:t>0);</a:t>
             </a:r>
-            <a:endParaRPr sz="2000">
+            <a:endParaRPr sz="2000" dirty="0">
               <a:latin typeface="Courier New" panose="02070309020205020404"/>
               <a:cs typeface="Courier New" panose="02070309020205020404"/>
             </a:endParaRPr>
@@ -28654,7 +28801,7 @@
               </a:rPr>
               <a:t>);</a:t>
             </a:r>
-            <a:endParaRPr sz="2000">
+            <a:endParaRPr sz="2000" dirty="0">
               <a:latin typeface="Courier New" panose="02070309020205020404"/>
               <a:cs typeface="Courier New" panose="02070309020205020404"/>
             </a:endParaRPr>
@@ -28720,9 +28867,11 @@
         <p:spPr/>
         <p:txBody>
           <a:bodyPr/>
+          <a:lstStyle/>
           <a:p>
             <a:fld id="{B6F15528-21DE-4FAA-801E-634DDDAF4B2B}" type="slidenum">
               <a:rPr/>
+              <a:t>33</a:t>
             </a:fld>
             <a:endParaRPr/>
           </a:p>
@@ -29264,7 +29413,7 @@
               </a:rPr>
               <a:t>values</a:t>
             </a:r>
-            <a:endParaRPr sz="2200">
+            <a:endParaRPr sz="2200" dirty="0">
               <a:latin typeface="Verdana" panose="020B0604030504040204"/>
               <a:cs typeface="Verdana" panose="020B0604030504040204"/>
             </a:endParaRPr>
@@ -29339,7 +29488,17 @@
                 <a:latin typeface="Verdana" panose="020B0604030504040204"/>
                 <a:cs typeface="Verdana" panose="020B0604030504040204"/>
               </a:rPr>
-              <a:t>ellipse</a:t>
+              <a:t>ellips</a:t>
+            </a:r>
+            <a:r>
+              <a:rPr lang="en-US" sz="2200" spc="-15" dirty="0">
+                <a:solidFill>
+                  <a:srgbClr val="404040"/>
+                </a:solidFill>
+                <a:latin typeface="Verdana" panose="020B0604030504040204"/>
+                <a:cs typeface="Verdana" panose="020B0604030504040204"/>
+              </a:rPr>
+              <a:t>is</a:t>
             </a:r>
             <a:r>
               <a:rPr sz="2200" spc="-120" dirty="0">
@@ -29401,7 +29560,7 @@
               </a:rPr>
               <a:t>type</a:t>
             </a:r>
-            <a:endParaRPr sz="2200">
+            <a:endParaRPr sz="2200" dirty="0">
               <a:latin typeface="Verdana" panose="020B0604030504040204"/>
               <a:cs typeface="Verdana" panose="020B0604030504040204"/>
             </a:endParaRPr>
@@ -29455,7 +29614,9 @@
         <p:txBody>
           <a:bodyPr wrap="square" lIns="0" tIns="0" rIns="0" bIns="0" rtlCol="0"/>
           <a:lstStyle/>
-          <a:p/>
+          <a:p>
+            <a:endParaRPr/>
+          </a:p>
         </p:txBody>
       </p:sp>
       <p:sp>
@@ -29471,9 +29632,11 @@
         <p:spPr/>
         <p:txBody>
           <a:bodyPr/>
+          <a:lstStyle/>
           <a:p>
             <a:fld id="{B6F15528-21DE-4FAA-801E-634DDDAF4B2B}" type="slidenum">
               <a:rPr/>
+              <a:t>34</a:t>
             </a:fld>
             <a:endParaRPr/>
           </a:p>
@@ -29745,7 +29908,7 @@
         <p:spPr>
           <a:xfrm>
             <a:off x="409829" y="4630420"/>
-            <a:ext cx="10572115" cy="1674495"/>
+            <a:ext cx="10572115" cy="1693412"/>
           </a:xfrm>
           <a:prstGeom prst="rect">
             <a:avLst/>
@@ -30015,7 +30178,7 @@
               </a:rPr>
               <a:t>values</a:t>
             </a:r>
-            <a:endParaRPr sz="2200">
+            <a:endParaRPr sz="2200" dirty="0">
               <a:latin typeface="Verdana" panose="020B0604030504040204"/>
               <a:cs typeface="Verdana" panose="020B0604030504040204"/>
             </a:endParaRPr>
@@ -30084,7 +30247,17 @@
                 <a:latin typeface="Verdana" panose="020B0604030504040204"/>
                 <a:cs typeface="Verdana" panose="020B0604030504040204"/>
               </a:rPr>
-              <a:t>ellipse</a:t>
+              <a:t>ellips</a:t>
+            </a:r>
+            <a:r>
+              <a:rPr lang="en-US" sz="2200" spc="-15" dirty="0">
+                <a:solidFill>
+                  <a:srgbClr val="404040"/>
+                </a:solidFill>
+                <a:latin typeface="Verdana" panose="020B0604030504040204"/>
+                <a:cs typeface="Verdana" panose="020B0604030504040204"/>
+              </a:rPr>
+              <a:t>is</a:t>
             </a:r>
             <a:r>
               <a:rPr sz="2200" spc="-120" dirty="0">
@@ -30146,7 +30319,7 @@
               </a:rPr>
               <a:t>type</a:t>
             </a:r>
-            <a:endParaRPr sz="2200">
+            <a:endParaRPr sz="2200" dirty="0">
               <a:latin typeface="Verdana" panose="020B0604030504040204"/>
               <a:cs typeface="Verdana" panose="020B0604030504040204"/>
             </a:endParaRPr>
@@ -30277,7 +30450,7 @@
               </a:rPr>
               <a:t>parameter</a:t>
             </a:r>
-            <a:endParaRPr sz="2200">
+            <a:endParaRPr sz="2200" dirty="0">
               <a:latin typeface="Verdana" panose="020B0604030504040204"/>
               <a:cs typeface="Verdana" panose="020B0604030504040204"/>
             </a:endParaRPr>
@@ -30408,7 +30581,7 @@
               </a:rPr>
               <a:t>array</a:t>
             </a:r>
-            <a:endParaRPr sz="2200">
+            <a:endParaRPr sz="2200" dirty="0">
               <a:latin typeface="Verdana" panose="020B0604030504040204"/>
               <a:cs typeface="Verdana" panose="020B0604030504040204"/>
             </a:endParaRPr>
@@ -30462,7 +30635,9 @@
         <p:txBody>
           <a:bodyPr wrap="square" lIns="0" tIns="0" rIns="0" bIns="0" rtlCol="0"/>
           <a:lstStyle/>
-          <a:p/>
+          <a:p>
+            <a:endParaRPr/>
+          </a:p>
         </p:txBody>
       </p:sp>
       <p:sp>
@@ -30478,9 +30653,11 @@
         <p:spPr/>
         <p:txBody>
           <a:bodyPr/>
+          <a:lstStyle/>
           <a:p>
             <a:fld id="{B6F15528-21DE-4FAA-801E-634DDDAF4B2B}" type="slidenum">
               <a:rPr/>
+              <a:t>35</a:t>
             </a:fld>
             <a:endParaRPr/>
           </a:p>
@@ -30556,7 +30733,9 @@
         <p:txBody>
           <a:bodyPr wrap="square" lIns="0" tIns="0" rIns="0" bIns="0" rtlCol="0"/>
           <a:lstStyle/>
-          <a:p/>
+          <a:p>
+            <a:endParaRPr/>
+          </a:p>
         </p:txBody>
       </p:sp>
       <p:sp>
@@ -31058,9 +31237,11 @@
         <p:spPr/>
         <p:txBody>
           <a:bodyPr/>
+          <a:lstStyle/>
           <a:p>
             <a:fld id="{B6F15528-21DE-4FAA-801E-634DDDAF4B2B}" type="slidenum">
               <a:rPr/>
+              <a:t>36</a:t>
             </a:fld>
             <a:endParaRPr/>
           </a:p>
@@ -31196,11 +31377,6 @@
               </a:rPr>
               <a:t>Flight();</a:t>
             </a:r>
-            <a:endParaRPr spc="-5" dirty="0">
-              <a:solidFill>
-                <a:srgbClr val="F2F2F2"/>
-              </a:solidFill>
-            </a:endParaRPr>
           </a:p>
         </p:txBody>
       </p:sp>
@@ -31978,9 +32154,11 @@
         <p:spPr/>
         <p:txBody>
           <a:bodyPr/>
+          <a:lstStyle/>
           <a:p>
             <a:fld id="{B6F15528-21DE-4FAA-801E-634DDDAF4B2B}" type="slidenum">
               <a:rPr/>
+              <a:t>37</a:t>
             </a:fld>
             <a:endParaRPr/>
           </a:p>
@@ -32116,11 +32294,6 @@
               </a:rPr>
               <a:t>Flight();</a:t>
             </a:r>
-            <a:endParaRPr spc="-5" dirty="0">
-              <a:solidFill>
-                <a:srgbClr val="F2F2F2"/>
-              </a:solidFill>
-            </a:endParaRPr>
           </a:p>
         </p:txBody>
       </p:sp>
@@ -32263,7 +32436,7 @@
               </a:rPr>
               <a:t>1);</a:t>
             </a:r>
-            <a:endParaRPr sz="2000">
+            <a:endParaRPr sz="2000" dirty="0">
               <a:latin typeface="Courier New" panose="02070309020205020404"/>
               <a:cs typeface="Courier New" panose="02070309020205020404"/>
             </a:endParaRPr>
@@ -32384,7 +32557,7 @@
               </a:rPr>
               <a:t>);</a:t>
             </a:r>
-            <a:endParaRPr sz="2000">
+            <a:endParaRPr sz="2000" dirty="0">
               <a:latin typeface="Courier New" panose="02070309020205020404"/>
               <a:cs typeface="Courier New" panose="02070309020205020404"/>
             </a:endParaRPr>
@@ -32608,7 +32781,7 @@
               </a:rPr>
               <a:t>0);</a:t>
             </a:r>
-            <a:endParaRPr sz="2000">
+            <a:endParaRPr sz="2000" dirty="0">
               <a:latin typeface="Courier New" panose="02070309020205020404"/>
               <a:cs typeface="Courier New" panose="02070309020205020404"/>
             </a:endParaRPr>
@@ -32772,7 +32945,7 @@
               </a:rPr>
               <a:t>);</a:t>
             </a:r>
-            <a:endParaRPr sz="2000">
+            <a:endParaRPr sz="2000" dirty="0">
               <a:latin typeface="Courier New" panose="02070309020205020404"/>
               <a:cs typeface="Courier New" panose="02070309020205020404"/>
             </a:endParaRPr>
@@ -32838,9 +33011,11 @@
         <p:spPr/>
         <p:txBody>
           <a:bodyPr/>
+          <a:lstStyle/>
           <a:p>
             <a:fld id="{B6F15528-21DE-4FAA-801E-634DDDAF4B2B}" type="slidenum">
               <a:rPr/>
+              <a:t>38</a:t>
             </a:fld>
             <a:endParaRPr/>
           </a:p>
@@ -32976,11 +33151,6 @@
               </a:rPr>
               <a:t>Flight();</a:t>
             </a:r>
-            <a:endParaRPr spc="-5" dirty="0">
-              <a:solidFill>
-                <a:srgbClr val="F2F2F2"/>
-              </a:solidFill>
-            </a:endParaRPr>
           </a:p>
         </p:txBody>
       </p:sp>
@@ -33123,7 +33293,7 @@
               </a:rPr>
               <a:t>1);</a:t>
             </a:r>
-            <a:endParaRPr sz="2000">
+            <a:endParaRPr sz="2000" dirty="0">
               <a:latin typeface="Courier New" panose="02070309020205020404"/>
               <a:cs typeface="Courier New" panose="02070309020205020404"/>
             </a:endParaRPr>
@@ -33244,7 +33414,7 @@
               </a:rPr>
               <a:t>);</a:t>
             </a:r>
-            <a:endParaRPr sz="2000">
+            <a:endParaRPr sz="2000" dirty="0">
               <a:latin typeface="Courier New" panose="02070309020205020404"/>
               <a:cs typeface="Courier New" panose="02070309020205020404"/>
             </a:endParaRPr>
@@ -33498,7 +33668,7 @@
               </a:rPr>
               <a:t>);</a:t>
             </a:r>
-            <a:endParaRPr sz="2000">
+            <a:endParaRPr sz="2000" dirty="0">
               <a:latin typeface="Courier New" panose="02070309020205020404"/>
               <a:cs typeface="Courier New" panose="02070309020205020404"/>
             </a:endParaRPr>
@@ -33564,9 +33734,11 @@
         <p:spPr/>
         <p:txBody>
           <a:bodyPr/>
+          <a:lstStyle/>
           <a:p>
             <a:fld id="{B6F15528-21DE-4FAA-801E-634DDDAF4B2B}" type="slidenum">
               <a:rPr/>
+              <a:t>39</a:t>
             </a:fld>
             <a:endParaRPr/>
           </a:p>
@@ -33686,11 +33858,6 @@
               </a:rPr>
               <a:t>{</a:t>
             </a:r>
-            <a:endParaRPr dirty="0">
-              <a:solidFill>
-                <a:srgbClr val="F2F2F2"/>
-              </a:solidFill>
-            </a:endParaRPr>
           </a:p>
           <a:p>
             <a:pPr marL="316865">
@@ -33741,11 +33908,6 @@
               </a:rPr>
               <a:t>flightNumber;</a:t>
             </a:r>
-            <a:endParaRPr spc="-5" dirty="0">
-              <a:solidFill>
-                <a:srgbClr val="F2F2F2"/>
-              </a:solidFill>
-            </a:endParaRPr>
           </a:p>
         </p:txBody>
       </p:sp>
@@ -34121,9 +34283,11 @@
         <p:spPr/>
         <p:txBody>
           <a:bodyPr/>
+          <a:lstStyle/>
           <a:p>
             <a:fld id="{B6F15528-21DE-4FAA-801E-634DDDAF4B2B}" type="slidenum">
               <a:rPr/>
+              <a:t>4</a:t>
             </a:fld>
             <a:endParaRPr/>
           </a:p>
@@ -34161,7 +34325,7 @@
           <p:nvPr/>
         </p:nvPicPr>
         <p:blipFill>
-          <a:blip r:embed="rId1" cstate="print"/>
+          <a:blip r:embed="rId2" cstate="print"/>
           <a:stretch>
             <a:fillRect/>
           </a:stretch>
@@ -35028,9 +35192,11 @@
         <p:spPr/>
         <p:txBody>
           <a:bodyPr/>
+          <a:lstStyle/>
           <a:p>
             <a:fld id="{B6F15528-21DE-4FAA-801E-634DDDAF4B2B}" type="slidenum">
               <a:rPr/>
+              <a:t>40</a:t>
             </a:fld>
             <a:endParaRPr/>
           </a:p>
@@ -35068,7 +35234,7 @@
           <p:nvPr/>
         </p:nvPicPr>
         <p:blipFill>
-          <a:blip r:embed="rId1" cstate="print"/>
+          <a:blip r:embed="rId2" cstate="print"/>
           <a:stretch>
             <a:fillRect/>
           </a:stretch>
@@ -35975,9 +36141,11 @@
         <p:spPr/>
         <p:txBody>
           <a:bodyPr/>
+          <a:lstStyle/>
           <a:p>
             <a:fld id="{B6F15528-21DE-4FAA-801E-634DDDAF4B2B}" type="slidenum">
               <a:rPr/>
+              <a:t>41</a:t>
             </a:fld>
             <a:endParaRPr/>
           </a:p>
@@ -36015,7 +36183,7 @@
           <p:nvPr/>
         </p:nvPicPr>
         <p:blipFill>
-          <a:blip r:embed="rId1" cstate="print"/>
+          <a:blip r:embed="rId2" cstate="print"/>
           <a:stretch>
             <a:fillRect/>
           </a:stretch>
@@ -36522,9 +36690,11 @@
         <p:spPr/>
         <p:txBody>
           <a:bodyPr/>
+          <a:lstStyle/>
           <a:p>
             <a:fld id="{B6F15528-21DE-4FAA-801E-634DDDAF4B2B}" type="slidenum">
               <a:rPr/>
+              <a:t>42</a:t>
             </a:fld>
             <a:endParaRPr/>
           </a:p>
@@ -37507,7 +37677,9 @@
           <p:txBody>
             <a:bodyPr wrap="square" lIns="0" tIns="0" rIns="0" bIns="0" rtlCol="0"/>
             <a:lstStyle/>
-            <a:p/>
+            <a:p>
+              <a:endParaRPr/>
+            </a:p>
           </p:txBody>
         </p:sp>
         <p:sp>
@@ -37555,7 +37727,9 @@
           <p:txBody>
             <a:bodyPr wrap="square" lIns="0" tIns="0" rIns="0" bIns="0" rtlCol="0"/>
             <a:lstStyle/>
-            <a:p/>
+            <a:p>
+              <a:endParaRPr/>
+            </a:p>
           </p:txBody>
         </p:sp>
         <p:sp>
@@ -37605,7 +37779,9 @@
           <p:txBody>
             <a:bodyPr wrap="square" lIns="0" tIns="0" rIns="0" bIns="0" rtlCol="0"/>
             <a:lstStyle/>
-            <a:p/>
+            <a:p>
+              <a:endParaRPr/>
+            </a:p>
           </p:txBody>
         </p:sp>
       </p:grpSp>
@@ -37738,7 +37914,9 @@
           <p:txBody>
             <a:bodyPr wrap="square" lIns="0" tIns="0" rIns="0" bIns="0" rtlCol="0"/>
             <a:lstStyle/>
-            <a:p/>
+            <a:p>
+              <a:endParaRPr/>
+            </a:p>
           </p:txBody>
         </p:sp>
         <p:sp>
@@ -37788,7 +37966,9 @@
           <p:txBody>
             <a:bodyPr wrap="square" lIns="0" tIns="0" rIns="0" bIns="0" rtlCol="0"/>
             <a:lstStyle/>
-            <a:p/>
+            <a:p>
+              <a:endParaRPr/>
+            </a:p>
           </p:txBody>
         </p:sp>
         <p:sp>
@@ -37992,7 +38172,9 @@
           <p:txBody>
             <a:bodyPr wrap="square" lIns="0" tIns="0" rIns="0" bIns="0" rtlCol="0"/>
             <a:lstStyle/>
-            <a:p/>
+            <a:p>
+              <a:endParaRPr/>
+            </a:p>
           </p:txBody>
         </p:sp>
       </p:grpSp>
@@ -38029,7 +38211,6 @@
               <a:rPr spc="-5" dirty="0"/>
               <a:t>val1</a:t>
             </a:r>
-            <a:endParaRPr spc="-5" dirty="0"/>
           </a:p>
         </p:txBody>
       </p:sp>
@@ -38138,7 +38319,9 @@
         <p:txBody>
           <a:bodyPr wrap="square" lIns="0" tIns="0" rIns="0" bIns="0" rtlCol="0"/>
           <a:lstStyle/>
-          <a:p/>
+          <a:p>
+            <a:endParaRPr/>
+          </a:p>
         </p:txBody>
       </p:sp>
       <p:sp>
@@ -38300,7 +38483,9 @@
           <p:txBody>
             <a:bodyPr wrap="square" lIns="0" tIns="0" rIns="0" bIns="0" rtlCol="0"/>
             <a:lstStyle/>
-            <a:p/>
+            <a:p>
+              <a:endParaRPr/>
+            </a:p>
           </p:txBody>
         </p:sp>
         <p:sp>
@@ -38350,7 +38535,9 @@
           <p:txBody>
             <a:bodyPr wrap="square" lIns="0" tIns="0" rIns="0" bIns="0" rtlCol="0"/>
             <a:lstStyle/>
-            <a:p/>
+            <a:p>
+              <a:endParaRPr/>
+            </a:p>
           </p:txBody>
         </p:sp>
         <p:sp>
@@ -38554,7 +38741,9 @@
           <p:txBody>
             <a:bodyPr wrap="square" lIns="0" tIns="0" rIns="0" bIns="0" rtlCol="0"/>
             <a:lstStyle/>
-            <a:p/>
+            <a:p>
+              <a:endParaRPr/>
+            </a:p>
           </p:txBody>
         </p:sp>
       </p:grpSp>
@@ -38663,7 +38852,9 @@
           <p:txBody>
             <a:bodyPr wrap="square" lIns="0" tIns="0" rIns="0" bIns="0" rtlCol="0"/>
             <a:lstStyle/>
-            <a:p/>
+            <a:p>
+              <a:endParaRPr/>
+            </a:p>
           </p:txBody>
         </p:sp>
         <p:sp>
@@ -38713,7 +38904,9 @@
           <p:txBody>
             <a:bodyPr wrap="square" lIns="0" tIns="0" rIns="0" bIns="0" rtlCol="0"/>
             <a:lstStyle/>
-            <a:p/>
+            <a:p>
+              <a:endParaRPr/>
+            </a:p>
           </p:txBody>
         </p:sp>
       </p:grpSp>
@@ -38822,7 +39015,9 @@
           <p:txBody>
             <a:bodyPr wrap="square" lIns="0" tIns="0" rIns="0" bIns="0" rtlCol="0"/>
             <a:lstStyle/>
-            <a:p/>
+            <a:p>
+              <a:endParaRPr/>
+            </a:p>
           </p:txBody>
         </p:sp>
         <p:sp>
@@ -38872,7 +39067,9 @@
           <p:txBody>
             <a:bodyPr wrap="square" lIns="0" tIns="0" rIns="0" bIns="0" rtlCol="0"/>
             <a:lstStyle/>
-            <a:p/>
+            <a:p>
+              <a:endParaRPr/>
+            </a:p>
           </p:txBody>
         </p:sp>
       </p:grpSp>
@@ -38929,7 +39126,7 @@
           <p:nvPr/>
         </p:nvPicPr>
         <p:blipFill>
-          <a:blip r:embed="rId1" cstate="print"/>
+          <a:blip r:embed="rId2" cstate="print"/>
           <a:stretch>
             <a:fillRect/>
           </a:stretch>
@@ -39165,7 +39362,9 @@
           <p:txBody>
             <a:bodyPr wrap="square" lIns="0" tIns="0" rIns="0" bIns="0" rtlCol="0"/>
             <a:lstStyle/>
-            <a:p/>
+            <a:p>
+              <a:endParaRPr/>
+            </a:p>
           </p:txBody>
         </p:sp>
         <p:sp>
@@ -39375,7 +39574,9 @@
           <p:txBody>
             <a:bodyPr wrap="square" lIns="0" tIns="0" rIns="0" bIns="0" rtlCol="0"/>
             <a:lstStyle/>
-            <a:p/>
+            <a:p>
+              <a:endParaRPr/>
+            </a:p>
           </p:txBody>
         </p:sp>
         <p:pic>
@@ -39385,7 +39586,7 @@
             <p:nvPr/>
           </p:nvPicPr>
           <p:blipFill>
-            <a:blip r:embed="rId2" cstate="print"/>
+            <a:blip r:embed="rId3" cstate="print"/>
             <a:stretch>
               <a:fillRect/>
             </a:stretch>
@@ -39414,9 +39615,11 @@
         <p:spPr/>
         <p:txBody>
           <a:bodyPr/>
+          <a:lstStyle/>
           <a:p>
             <a:fld id="{B6F15528-21DE-4FAA-801E-634DDDAF4B2B}" type="slidenum">
               <a:rPr/>
+              <a:t>5</a:t>
             </a:fld>
             <a:endParaRPr/>
           </a:p>
@@ -40486,7 +40689,9 @@
         <p:txBody>
           <a:bodyPr wrap="square" lIns="0" tIns="0" rIns="0" bIns="0" rtlCol="0"/>
           <a:lstStyle/>
-          <a:p/>
+          <a:p>
+            <a:endParaRPr/>
+          </a:p>
         </p:txBody>
       </p:sp>
       <p:sp>
@@ -40648,7 +40853,9 @@
           <p:txBody>
             <a:bodyPr wrap="square" lIns="0" tIns="0" rIns="0" bIns="0" rtlCol="0"/>
             <a:lstStyle/>
-            <a:p/>
+            <a:p>
+              <a:endParaRPr/>
+            </a:p>
           </p:txBody>
         </p:sp>
         <p:sp>
@@ -40698,7 +40905,9 @@
           <p:txBody>
             <a:bodyPr wrap="square" lIns="0" tIns="0" rIns="0" bIns="0" rtlCol="0"/>
             <a:lstStyle/>
-            <a:p/>
+            <a:p>
+              <a:endParaRPr/>
+            </a:p>
           </p:txBody>
         </p:sp>
         <p:sp>
@@ -40902,7 +41111,9 @@
           <p:txBody>
             <a:bodyPr wrap="square" lIns="0" tIns="0" rIns="0" bIns="0" rtlCol="0"/>
             <a:lstStyle/>
-            <a:p/>
+            <a:p>
+              <a:endParaRPr/>
+            </a:p>
           </p:txBody>
         </p:sp>
       </p:grpSp>
@@ -40939,7 +41150,6 @@
               <a:rPr spc="-5" dirty="0"/>
               <a:t>val1</a:t>
             </a:r>
-            <a:endParaRPr spc="-5" dirty="0"/>
           </a:p>
         </p:txBody>
       </p:sp>
@@ -41048,7 +41258,9 @@
         <p:txBody>
           <a:bodyPr wrap="square" lIns="0" tIns="0" rIns="0" bIns="0" rtlCol="0"/>
           <a:lstStyle/>
-          <a:p/>
+          <a:p>
+            <a:endParaRPr/>
+          </a:p>
         </p:txBody>
       </p:sp>
       <p:sp>
@@ -41210,7 +41422,9 @@
           <p:txBody>
             <a:bodyPr wrap="square" lIns="0" tIns="0" rIns="0" bIns="0" rtlCol="0"/>
             <a:lstStyle/>
-            <a:p/>
+            <a:p>
+              <a:endParaRPr/>
+            </a:p>
           </p:txBody>
         </p:sp>
         <p:sp>
@@ -41260,7 +41474,9 @@
           <p:txBody>
             <a:bodyPr wrap="square" lIns="0" tIns="0" rIns="0" bIns="0" rtlCol="0"/>
             <a:lstStyle/>
-            <a:p/>
+            <a:p>
+              <a:endParaRPr/>
+            </a:p>
           </p:txBody>
         </p:sp>
         <p:sp>
@@ -41464,7 +41680,9 @@
           <p:txBody>
             <a:bodyPr wrap="square" lIns="0" tIns="0" rIns="0" bIns="0" rtlCol="0"/>
             <a:lstStyle/>
-            <a:p/>
+            <a:p>
+              <a:endParaRPr/>
+            </a:p>
           </p:txBody>
         </p:sp>
       </p:grpSp>
@@ -41573,7 +41791,9 @@
           <p:txBody>
             <a:bodyPr wrap="square" lIns="0" tIns="0" rIns="0" bIns="0" rtlCol="0"/>
             <a:lstStyle/>
-            <a:p/>
+            <a:p>
+              <a:endParaRPr/>
+            </a:p>
           </p:txBody>
         </p:sp>
         <p:sp>
@@ -41623,7 +41843,9 @@
           <p:txBody>
             <a:bodyPr wrap="square" lIns="0" tIns="0" rIns="0" bIns="0" rtlCol="0"/>
             <a:lstStyle/>
-            <a:p/>
+            <a:p>
+              <a:endParaRPr/>
+            </a:p>
           </p:txBody>
         </p:sp>
       </p:grpSp>
@@ -41732,7 +41954,9 @@
           <p:txBody>
             <a:bodyPr wrap="square" lIns="0" tIns="0" rIns="0" bIns="0" rtlCol="0"/>
             <a:lstStyle/>
-            <a:p/>
+            <a:p>
+              <a:endParaRPr/>
+            </a:p>
           </p:txBody>
         </p:sp>
         <p:sp>
@@ -41782,7 +42006,9 @@
           <p:txBody>
             <a:bodyPr wrap="square" lIns="0" tIns="0" rIns="0" bIns="0" rtlCol="0"/>
             <a:lstStyle/>
-            <a:p/>
+            <a:p>
+              <a:endParaRPr/>
+            </a:p>
           </p:txBody>
         </p:sp>
       </p:grpSp>
@@ -42053,7 +42279,9 @@
           <p:txBody>
             <a:bodyPr wrap="square" lIns="0" tIns="0" rIns="0" bIns="0" rtlCol="0"/>
             <a:lstStyle/>
-            <a:p/>
+            <a:p>
+              <a:endParaRPr/>
+            </a:p>
           </p:txBody>
         </p:sp>
         <p:sp>
@@ -42263,7 +42491,9 @@
           <p:txBody>
             <a:bodyPr wrap="square" lIns="0" tIns="0" rIns="0" bIns="0" rtlCol="0"/>
             <a:lstStyle/>
-            <a:p/>
+            <a:p>
+              <a:endParaRPr/>
+            </a:p>
           </p:txBody>
         </p:sp>
         <p:sp>
@@ -42311,7 +42541,9 @@
           <p:txBody>
             <a:bodyPr wrap="square" lIns="0" tIns="0" rIns="0" bIns="0" rtlCol="0"/>
             <a:lstStyle/>
-            <a:p/>
+            <a:p>
+              <a:endParaRPr/>
+            </a:p>
           </p:txBody>
         </p:sp>
         <p:sp>
@@ -42361,7 +42593,9 @@
           <p:txBody>
             <a:bodyPr wrap="square" lIns="0" tIns="0" rIns="0" bIns="0" rtlCol="0"/>
             <a:lstStyle/>
-            <a:p/>
+            <a:p>
+              <a:endParaRPr/>
+            </a:p>
           </p:txBody>
         </p:sp>
       </p:grpSp>
@@ -42632,7 +42866,9 @@
           <p:txBody>
             <a:bodyPr wrap="square" lIns="0" tIns="0" rIns="0" bIns="0" rtlCol="0"/>
             <a:lstStyle/>
-            <a:p/>
+            <a:p>
+              <a:endParaRPr/>
+            </a:p>
           </p:txBody>
         </p:sp>
         <p:sp>
@@ -42842,7 +43078,9 @@
           <p:txBody>
             <a:bodyPr wrap="square" lIns="0" tIns="0" rIns="0" bIns="0" rtlCol="0"/>
             <a:lstStyle/>
-            <a:p/>
+            <a:p>
+              <a:endParaRPr/>
+            </a:p>
           </p:txBody>
         </p:sp>
         <p:sp>
@@ -43067,7 +43305,9 @@
           <p:txBody>
             <a:bodyPr wrap="square" lIns="0" tIns="0" rIns="0" bIns="0" rtlCol="0"/>
             <a:lstStyle/>
-            <a:p/>
+            <a:p>
+              <a:endParaRPr/>
+            </a:p>
           </p:txBody>
         </p:sp>
         <p:sp>
@@ -43165,7 +43405,9 @@
           <p:txBody>
             <a:bodyPr wrap="square" lIns="0" tIns="0" rIns="0" bIns="0" rtlCol="0"/>
             <a:lstStyle/>
-            <a:p/>
+            <a:p>
+              <a:endParaRPr/>
+            </a:p>
           </p:txBody>
         </p:sp>
         <p:sp>
@@ -43263,7 +43505,9 @@
           <p:txBody>
             <a:bodyPr wrap="square" lIns="0" tIns="0" rIns="0" bIns="0" rtlCol="0"/>
             <a:lstStyle/>
-            <a:p/>
+            <a:p>
+              <a:endParaRPr/>
+            </a:p>
           </p:txBody>
         </p:sp>
       </p:grpSp>
@@ -43280,9 +43524,11 @@
         <p:spPr/>
         <p:txBody>
           <a:bodyPr/>
+          <a:lstStyle/>
           <a:p>
             <a:fld id="{B6F15528-21DE-4FAA-801E-634DDDAF4B2B}" type="slidenum">
               <a:rPr/>
+              <a:t>6</a:t>
             </a:fld>
             <a:endParaRPr/>
           </a:p>
@@ -43320,7 +43566,7 @@
           <p:nvPr/>
         </p:nvPicPr>
         <p:blipFill>
-          <a:blip r:embed="rId1" cstate="print"/>
+          <a:blip r:embed="rId2" cstate="print"/>
           <a:stretch>
             <a:fillRect/>
           </a:stretch>
@@ -43342,7 +43588,7 @@
           <p:nvPr/>
         </p:nvPicPr>
         <p:blipFill>
-          <a:blip r:embed="rId2" cstate="print"/>
+          <a:blip r:embed="rId3" cstate="print"/>
           <a:stretch>
             <a:fillRect/>
           </a:stretch>
@@ -43364,7 +43610,7 @@
           <p:nvPr/>
         </p:nvPicPr>
         <p:blipFill>
-          <a:blip r:embed="rId3" cstate="print"/>
+          <a:blip r:embed="rId4" cstate="print"/>
           <a:stretch>
             <a:fillRect/>
           </a:stretch>
@@ -44118,9 +44364,11 @@
         <p:spPr/>
         <p:txBody>
           <a:bodyPr/>
+          <a:lstStyle/>
           <a:p>
             <a:fld id="{B6F15528-21DE-4FAA-801E-634DDDAF4B2B}" type="slidenum">
               <a:rPr/>
+              <a:t>7</a:t>
             </a:fld>
             <a:endParaRPr/>
           </a:p>
@@ -44937,7 +45185,9 @@
           <p:txBody>
             <a:bodyPr wrap="square" lIns="0" tIns="0" rIns="0" bIns="0" rtlCol="0"/>
             <a:lstStyle/>
-            <a:p/>
+            <a:p>
+              <a:endParaRPr/>
+            </a:p>
           </p:txBody>
         </p:sp>
         <p:sp>
@@ -44985,7 +45235,9 @@
           <p:txBody>
             <a:bodyPr wrap="square" lIns="0" tIns="0" rIns="0" bIns="0" rtlCol="0"/>
             <a:lstStyle/>
-            <a:p/>
+            <a:p>
+              <a:endParaRPr/>
+            </a:p>
           </p:txBody>
         </p:sp>
         <p:sp>
@@ -45035,7 +45287,9 @@
           <p:txBody>
             <a:bodyPr wrap="square" lIns="0" tIns="0" rIns="0" bIns="0" rtlCol="0"/>
             <a:lstStyle/>
-            <a:p/>
+            <a:p>
+              <a:endParaRPr/>
+            </a:p>
           </p:txBody>
         </p:sp>
       </p:grpSp>
@@ -45168,7 +45422,9 @@
           <p:txBody>
             <a:bodyPr wrap="square" lIns="0" tIns="0" rIns="0" bIns="0" rtlCol="0"/>
             <a:lstStyle/>
-            <a:p/>
+            <a:p>
+              <a:endParaRPr/>
+            </a:p>
           </p:txBody>
         </p:sp>
         <p:sp>
@@ -45218,7 +45474,9 @@
           <p:txBody>
             <a:bodyPr wrap="square" lIns="0" tIns="0" rIns="0" bIns="0" rtlCol="0"/>
             <a:lstStyle/>
-            <a:p/>
+            <a:p>
+              <a:endParaRPr/>
+            </a:p>
           </p:txBody>
         </p:sp>
         <p:sp>
@@ -45422,7 +45680,9 @@
           <p:txBody>
             <a:bodyPr wrap="square" lIns="0" tIns="0" rIns="0" bIns="0" rtlCol="0"/>
             <a:lstStyle/>
-            <a:p/>
+            <a:p>
+              <a:endParaRPr/>
+            </a:p>
           </p:txBody>
         </p:sp>
       </p:grpSp>
@@ -45459,7 +45719,6 @@
               <a:rPr spc="-5" dirty="0"/>
               <a:t>val1</a:t>
             </a:r>
-            <a:endParaRPr spc="-5" dirty="0"/>
           </a:p>
         </p:txBody>
       </p:sp>
@@ -45568,7 +45827,9 @@
         <p:txBody>
           <a:bodyPr wrap="square" lIns="0" tIns="0" rIns="0" bIns="0" rtlCol="0"/>
           <a:lstStyle/>
-          <a:p/>
+          <a:p>
+            <a:endParaRPr/>
+          </a:p>
         </p:txBody>
       </p:sp>
       <p:sp>
@@ -45730,7 +45991,9 @@
           <p:txBody>
             <a:bodyPr wrap="square" lIns="0" tIns="0" rIns="0" bIns="0" rtlCol="0"/>
             <a:lstStyle/>
-            <a:p/>
+            <a:p>
+              <a:endParaRPr/>
+            </a:p>
           </p:txBody>
         </p:sp>
         <p:sp>
@@ -45780,7 +46043,9 @@
           <p:txBody>
             <a:bodyPr wrap="square" lIns="0" tIns="0" rIns="0" bIns="0" rtlCol="0"/>
             <a:lstStyle/>
-            <a:p/>
+            <a:p>
+              <a:endParaRPr/>
+            </a:p>
           </p:txBody>
         </p:sp>
         <p:sp>
@@ -45984,7 +46249,9 @@
           <p:txBody>
             <a:bodyPr wrap="square" lIns="0" tIns="0" rIns="0" bIns="0" rtlCol="0"/>
             <a:lstStyle/>
-            <a:p/>
+            <a:p>
+              <a:endParaRPr/>
+            </a:p>
           </p:txBody>
         </p:sp>
       </p:grpSp>
@@ -46093,7 +46360,9 @@
           <p:txBody>
             <a:bodyPr wrap="square" lIns="0" tIns="0" rIns="0" bIns="0" rtlCol="0"/>
             <a:lstStyle/>
-            <a:p/>
+            <a:p>
+              <a:endParaRPr/>
+            </a:p>
           </p:txBody>
         </p:sp>
         <p:sp>
@@ -46143,7 +46412,9 @@
           <p:txBody>
             <a:bodyPr wrap="square" lIns="0" tIns="0" rIns="0" bIns="0" rtlCol="0"/>
             <a:lstStyle/>
-            <a:p/>
+            <a:p>
+              <a:endParaRPr/>
+            </a:p>
           </p:txBody>
         </p:sp>
       </p:grpSp>
@@ -46252,7 +46523,9 @@
           <p:txBody>
             <a:bodyPr wrap="square" lIns="0" tIns="0" rIns="0" bIns="0" rtlCol="0"/>
             <a:lstStyle/>
-            <a:p/>
+            <a:p>
+              <a:endParaRPr/>
+            </a:p>
           </p:txBody>
         </p:sp>
         <p:sp>
@@ -46302,7 +46575,9 @@
           <p:txBody>
             <a:bodyPr wrap="square" lIns="0" tIns="0" rIns="0" bIns="0" rtlCol="0"/>
             <a:lstStyle/>
-            <a:p/>
+            <a:p>
+              <a:endParaRPr/>
+            </a:p>
           </p:txBody>
         </p:sp>
       </p:grpSp>
@@ -46359,7 +46634,7 @@
           <p:nvPr/>
         </p:nvPicPr>
         <p:blipFill>
-          <a:blip r:embed="rId1" cstate="print"/>
+          <a:blip r:embed="rId2" cstate="print"/>
           <a:stretch>
             <a:fillRect/>
           </a:stretch>
@@ -46595,7 +46870,9 @@
           <p:txBody>
             <a:bodyPr wrap="square" lIns="0" tIns="0" rIns="0" bIns="0" rtlCol="0"/>
             <a:lstStyle/>
-            <a:p/>
+            <a:p>
+              <a:endParaRPr/>
+            </a:p>
           </p:txBody>
         </p:sp>
         <p:sp>
@@ -46805,7 +47082,9 @@
           <p:txBody>
             <a:bodyPr wrap="square" lIns="0" tIns="0" rIns="0" bIns="0" rtlCol="0"/>
             <a:lstStyle/>
-            <a:p/>
+            <a:p>
+              <a:endParaRPr/>
+            </a:p>
           </p:txBody>
         </p:sp>
         <p:pic>
@@ -46815,7 +47094,7 @@
             <p:nvPr/>
           </p:nvPicPr>
           <p:blipFill>
-            <a:blip r:embed="rId2" cstate="print"/>
+            <a:blip r:embed="rId3" cstate="print"/>
             <a:stretch>
               <a:fillRect/>
             </a:stretch>
@@ -46844,9 +47123,11 @@
         <p:spPr/>
         <p:txBody>
           <a:bodyPr/>
+          <a:lstStyle/>
           <a:p>
             <a:fld id="{B6F15528-21DE-4FAA-801E-634DDDAF4B2B}" type="slidenum">
               <a:rPr/>
+              <a:t>8</a:t>
             </a:fld>
             <a:endParaRPr/>
           </a:p>
@@ -47806,7 +48087,9 @@
           <p:txBody>
             <a:bodyPr wrap="square" lIns="0" tIns="0" rIns="0" bIns="0" rtlCol="0"/>
             <a:lstStyle/>
-            <a:p/>
+            <a:p>
+              <a:endParaRPr/>
+            </a:p>
           </p:txBody>
         </p:sp>
         <p:sp>
@@ -47854,7 +48137,9 @@
           <p:txBody>
             <a:bodyPr wrap="square" lIns="0" tIns="0" rIns="0" bIns="0" rtlCol="0"/>
             <a:lstStyle/>
-            <a:p/>
+            <a:p>
+              <a:endParaRPr/>
+            </a:p>
           </p:txBody>
         </p:sp>
         <p:sp>
@@ -47904,7 +48189,9 @@
           <p:txBody>
             <a:bodyPr wrap="square" lIns="0" tIns="0" rIns="0" bIns="0" rtlCol="0"/>
             <a:lstStyle/>
-            <a:p/>
+            <a:p>
+              <a:endParaRPr/>
+            </a:p>
           </p:txBody>
         </p:sp>
       </p:grpSp>
@@ -47967,7 +48254,9 @@
           <p:txBody>
             <a:bodyPr wrap="square" lIns="0" tIns="0" rIns="0" bIns="0" rtlCol="0"/>
             <a:lstStyle/>
-            <a:p/>
+            <a:p>
+              <a:endParaRPr/>
+            </a:p>
           </p:txBody>
         </p:sp>
         <p:sp>
@@ -48017,7 +48306,9 @@
           <p:txBody>
             <a:bodyPr wrap="square" lIns="0" tIns="0" rIns="0" bIns="0" rtlCol="0"/>
             <a:lstStyle/>
-            <a:p/>
+            <a:p>
+              <a:endParaRPr/>
+            </a:p>
           </p:txBody>
         </p:sp>
         <p:sp>
@@ -48221,7 +48512,9 @@
           <p:txBody>
             <a:bodyPr wrap="square" lIns="0" tIns="0" rIns="0" bIns="0" rtlCol="0"/>
             <a:lstStyle/>
-            <a:p/>
+            <a:p>
+              <a:endParaRPr/>
+            </a:p>
           </p:txBody>
         </p:sp>
       </p:grpSp>
@@ -48258,7 +48551,6 @@
               <a:rPr spc="-5" dirty="0"/>
               <a:t>val1</a:t>
             </a:r>
-            <a:endParaRPr spc="-5" dirty="0"/>
           </a:p>
         </p:txBody>
       </p:sp>
@@ -48367,7 +48659,9 @@
         <p:txBody>
           <a:bodyPr wrap="square" lIns="0" tIns="0" rIns="0" bIns="0" rtlCol="0"/>
           <a:lstStyle/>
-          <a:p/>
+          <a:p>
+            <a:endParaRPr/>
+          </a:p>
         </p:txBody>
       </p:sp>
       <p:sp>
@@ -48475,7 +48769,9 @@
           <p:txBody>
             <a:bodyPr wrap="square" lIns="0" tIns="0" rIns="0" bIns="0" rtlCol="0"/>
             <a:lstStyle/>
-            <a:p/>
+            <a:p>
+              <a:endParaRPr/>
+            </a:p>
           </p:txBody>
         </p:sp>
         <p:sp>
@@ -48525,7 +48821,9 @@
           <p:txBody>
             <a:bodyPr wrap="square" lIns="0" tIns="0" rIns="0" bIns="0" rtlCol="0"/>
             <a:lstStyle/>
-            <a:p/>
+            <a:p>
+              <a:endParaRPr/>
+            </a:p>
           </p:txBody>
         </p:sp>
         <p:sp>
@@ -48729,7 +49027,9 @@
           <p:txBody>
             <a:bodyPr wrap="square" lIns="0" tIns="0" rIns="0" bIns="0" rtlCol="0"/>
             <a:lstStyle/>
-            <a:p/>
+            <a:p>
+              <a:endParaRPr/>
+            </a:p>
           </p:txBody>
         </p:sp>
       </p:grpSp>
@@ -48838,7 +49138,9 @@
           <p:txBody>
             <a:bodyPr wrap="square" lIns="0" tIns="0" rIns="0" bIns="0" rtlCol="0"/>
             <a:lstStyle/>
-            <a:p/>
+            <a:p>
+              <a:endParaRPr/>
+            </a:p>
           </p:txBody>
         </p:sp>
         <p:sp>
@@ -48888,7 +49190,9 @@
           <p:txBody>
             <a:bodyPr wrap="square" lIns="0" tIns="0" rIns="0" bIns="0" rtlCol="0"/>
             <a:lstStyle/>
-            <a:p/>
+            <a:p>
+              <a:endParaRPr/>
+            </a:p>
           </p:txBody>
         </p:sp>
       </p:grpSp>
@@ -48997,7 +49301,9 @@
           <p:txBody>
             <a:bodyPr wrap="square" lIns="0" tIns="0" rIns="0" bIns="0" rtlCol="0"/>
             <a:lstStyle/>
-            <a:p/>
+            <a:p>
+              <a:endParaRPr/>
+            </a:p>
           </p:txBody>
         </p:sp>
         <p:sp>
@@ -49047,7 +49353,9 @@
           <p:txBody>
             <a:bodyPr wrap="square" lIns="0" tIns="0" rIns="0" bIns="0" rtlCol="0"/>
             <a:lstStyle/>
-            <a:p/>
+            <a:p>
+              <a:endParaRPr/>
+            </a:p>
           </p:txBody>
         </p:sp>
       </p:grpSp>
@@ -49318,7 +49626,9 @@
           <p:txBody>
             <a:bodyPr wrap="square" lIns="0" tIns="0" rIns="0" bIns="0" rtlCol="0"/>
             <a:lstStyle/>
-            <a:p/>
+            <a:p>
+              <a:endParaRPr/>
+            </a:p>
           </p:txBody>
         </p:sp>
         <p:sp>
@@ -49528,7 +49838,9 @@
           <p:txBody>
             <a:bodyPr wrap="square" lIns="0" tIns="0" rIns="0" bIns="0" rtlCol="0"/>
             <a:lstStyle/>
-            <a:p/>
+            <a:p>
+              <a:endParaRPr/>
+            </a:p>
           </p:txBody>
         </p:sp>
         <p:sp>
@@ -49638,7 +49950,9 @@
           <p:txBody>
             <a:bodyPr wrap="square" lIns="0" tIns="0" rIns="0" bIns="0" rtlCol="0"/>
             <a:lstStyle/>
-            <a:p/>
+            <a:p>
+              <a:endParaRPr/>
+            </a:p>
           </p:txBody>
         </p:sp>
       </p:grpSp>
@@ -49748,10 +50062,6 @@
               </a:rPr>
               <a:t>10</a:t>
             </a:r>
-            <a:endParaRPr lang="en-US" sz="2000">
-              <a:latin typeface="Courier New" panose="02070309020205020404"/>
-              <a:cs typeface="Courier New" panose="02070309020205020404"/>
-            </a:endParaRPr>
           </a:p>
         </p:txBody>
       </p:sp>
@@ -49862,7 +50172,9 @@
         <p:txBody>
           <a:bodyPr wrap="square" lIns="0" tIns="0" rIns="0" bIns="0" rtlCol="0"/>
           <a:lstStyle/>
-          <a:p/>
+          <a:p>
+            <a:endParaRPr/>
+          </a:p>
         </p:txBody>
       </p:sp>
       <p:sp>
@@ -49907,13 +50219,6 @@
               </a:rPr>
               <a:t>10</a:t>
             </a:r>
-            <a:endParaRPr sz="2000" spc="-5" dirty="0">
-              <a:solidFill>
-                <a:schemeClr val="bg1"/>
-              </a:solidFill>
-              <a:latin typeface="Courier New" panose="02070309020205020404"/>
-              <a:cs typeface="Courier New" panose="02070309020205020404"/>
-            </a:endParaRPr>
           </a:p>
         </p:txBody>
       </p:sp>
@@ -49961,10 +50266,6 @@
               </a:rPr>
               <a:t>20</a:t>
             </a:r>
-            <a:endParaRPr lang="en-US" sz="3000" baseline="1000">
-              <a:latin typeface="Courier New" panose="02070309020205020404"/>
-              <a:cs typeface="Courier New" panose="02070309020205020404"/>
-            </a:endParaRPr>
           </a:p>
         </p:txBody>
       </p:sp>
@@ -49981,9 +50282,11 @@
         <p:spPr/>
         <p:txBody>
           <a:bodyPr/>
+          <a:lstStyle/>
           <a:p>
             <a:fld id="{B6F15528-21DE-4FAA-801E-634DDDAF4B2B}" type="slidenum">
               <a:rPr/>
+              <a:t>9</a:t>
             </a:fld>
             <a:endParaRPr/>
           </a:p>
@@ -50275,6 +50578,8 @@
       </a:bgFillStyleLst>
     </a:fmtScheme>
   </a:themeElements>
+  <a:objectDefaults/>
+  <a:extraClrSchemeLst/>
   <a:extLst>
     <a:ext uri="{05A4C25C-085E-4340-85A3-A5531E510DB2}">
       <thm15:themeFamily xmlns:thm15="http://schemas.microsoft.com/office/thememl/2012/main" name="Office Theme" id="{62F939B6-93AF-4DB8-9C6B-D6C7DFDC589F}" vid="{4A3C46E8-61CC-4603-A589-7422A47A8E4A}"/>
@@ -50534,6 +50839,8 @@
       </a:bgFillStyleLst>
     </a:fmtScheme>
   </a:themeElements>
+  <a:objectDefaults/>
+  <a:extraClrSchemeLst/>
   <a:extLst>
     <a:ext uri="{05A4C25C-085E-4340-85A3-A5531E510DB2}">
       <thm15:themeFamily xmlns:thm15="http://schemas.microsoft.com/office/thememl/2012/main" name="Office Theme" id="{62F939B6-93AF-4DB8-9C6B-D6C7DFDC589F}" vid="{4A3C46E8-61CC-4603-A589-7422A47A8E4A}"/>

</xml_diff>